<commit_message>
updated code to generate table 1
</commit_message>
<xml_diff>
--- a/figures-EMA/prawnz-experiment-schematic-aug-2024.pptx
+++ b/figures-EMA/prawnz-experiment-schematic-aug-2024.pptx
@@ -272,7 +272,7 @@
           <a:p>
             <a:fld id="{A4775C85-13DE-43FB-84AB-BE9A96276C02}" type="datetimeFigureOut">
               <a:rPr lang="en-CA" smtClean="0"/>
-              <a:t>2024-08-05</a:t>
+              <a:t>2025-08-18</a:t>
             </a:fld>
             <a:endParaRPr lang="en-CA"/>
           </a:p>
@@ -472,7 +472,7 @@
           <a:p>
             <a:fld id="{A4775C85-13DE-43FB-84AB-BE9A96276C02}" type="datetimeFigureOut">
               <a:rPr lang="en-CA" smtClean="0"/>
-              <a:t>2024-08-05</a:t>
+              <a:t>2025-08-18</a:t>
             </a:fld>
             <a:endParaRPr lang="en-CA"/>
           </a:p>
@@ -682,7 +682,7 @@
           <a:p>
             <a:fld id="{A4775C85-13DE-43FB-84AB-BE9A96276C02}" type="datetimeFigureOut">
               <a:rPr lang="en-CA" smtClean="0"/>
-              <a:t>2024-08-05</a:t>
+              <a:t>2025-08-18</a:t>
             </a:fld>
             <a:endParaRPr lang="en-CA"/>
           </a:p>
@@ -882,7 +882,7 @@
           <a:p>
             <a:fld id="{A4775C85-13DE-43FB-84AB-BE9A96276C02}" type="datetimeFigureOut">
               <a:rPr lang="en-CA" smtClean="0"/>
-              <a:t>2024-08-05</a:t>
+              <a:t>2025-08-18</a:t>
             </a:fld>
             <a:endParaRPr lang="en-CA"/>
           </a:p>
@@ -1158,7 +1158,7 @@
           <a:p>
             <a:fld id="{A4775C85-13DE-43FB-84AB-BE9A96276C02}" type="datetimeFigureOut">
               <a:rPr lang="en-CA" smtClean="0"/>
-              <a:t>2024-08-05</a:t>
+              <a:t>2025-08-18</a:t>
             </a:fld>
             <a:endParaRPr lang="en-CA"/>
           </a:p>
@@ -1426,7 +1426,7 @@
           <a:p>
             <a:fld id="{A4775C85-13DE-43FB-84AB-BE9A96276C02}" type="datetimeFigureOut">
               <a:rPr lang="en-CA" smtClean="0"/>
-              <a:t>2024-08-05</a:t>
+              <a:t>2025-08-18</a:t>
             </a:fld>
             <a:endParaRPr lang="en-CA"/>
           </a:p>
@@ -1841,7 +1841,7 @@
           <a:p>
             <a:fld id="{A4775C85-13DE-43FB-84AB-BE9A96276C02}" type="datetimeFigureOut">
               <a:rPr lang="en-CA" smtClean="0"/>
-              <a:t>2024-08-05</a:t>
+              <a:t>2025-08-18</a:t>
             </a:fld>
             <a:endParaRPr lang="en-CA"/>
           </a:p>
@@ -1983,7 +1983,7 @@
           <a:p>
             <a:fld id="{A4775C85-13DE-43FB-84AB-BE9A96276C02}" type="datetimeFigureOut">
               <a:rPr lang="en-CA" smtClean="0"/>
-              <a:t>2024-08-05</a:t>
+              <a:t>2025-08-18</a:t>
             </a:fld>
             <a:endParaRPr lang="en-CA"/>
           </a:p>
@@ -2096,7 +2096,7 @@
           <a:p>
             <a:fld id="{A4775C85-13DE-43FB-84AB-BE9A96276C02}" type="datetimeFigureOut">
               <a:rPr lang="en-CA" smtClean="0"/>
-              <a:t>2024-08-05</a:t>
+              <a:t>2025-08-18</a:t>
             </a:fld>
             <a:endParaRPr lang="en-CA"/>
           </a:p>
@@ -2409,7 +2409,7 @@
           <a:p>
             <a:fld id="{A4775C85-13DE-43FB-84AB-BE9A96276C02}" type="datetimeFigureOut">
               <a:rPr lang="en-CA" smtClean="0"/>
-              <a:t>2024-08-05</a:t>
+              <a:t>2025-08-18</a:t>
             </a:fld>
             <a:endParaRPr lang="en-CA"/>
           </a:p>
@@ -2698,7 +2698,7 @@
           <a:p>
             <a:fld id="{A4775C85-13DE-43FB-84AB-BE9A96276C02}" type="datetimeFigureOut">
               <a:rPr lang="en-CA" smtClean="0"/>
-              <a:t>2024-08-05</a:t>
+              <a:t>2025-08-18</a:t>
             </a:fld>
             <a:endParaRPr lang="en-CA"/>
           </a:p>
@@ -2941,7 +2941,7 @@
           <a:p>
             <a:fld id="{A4775C85-13DE-43FB-84AB-BE9A96276C02}" type="datetimeFigureOut">
               <a:rPr lang="en-CA" smtClean="0"/>
-              <a:t>2024-08-05</a:t>
+              <a:t>2025-08-18</a:t>
             </a:fld>
             <a:endParaRPr lang="en-CA"/>
           </a:p>
@@ -3358,6 +3358,49 @@
           <a:chExt cx="0" cy="0"/>
         </a:xfrm>
       </p:grpSpPr>
+      <p:cxnSp>
+        <p:nvCxnSpPr>
+          <p:cNvPr id="133" name="Straight Connector 132">
+            <a:extLst>
+              <a:ext uri="{FF2B5EF4-FFF2-40B4-BE49-F238E27FC236}">
+                <a16:creationId xmlns:a16="http://schemas.microsoft.com/office/drawing/2014/main" id="{AD5BAC99-C7B0-0817-BF10-2D40FC034E7C}"/>
+              </a:ext>
+            </a:extLst>
+          </p:cNvPr>
+          <p:cNvCxnSpPr>
+            <a:cxnSpLocks/>
+          </p:cNvCxnSpPr>
+          <p:nvPr/>
+        </p:nvCxnSpPr>
+        <p:spPr>
+          <a:xfrm>
+            <a:off x="0" y="2033812"/>
+            <a:ext cx="5270500" cy="0"/>
+          </a:xfrm>
+          <a:prstGeom prst="line">
+            <a:avLst/>
+          </a:prstGeom>
+          <a:ln w="57150">
+            <a:solidFill>
+              <a:schemeClr val="accent1"/>
+            </a:solidFill>
+          </a:ln>
+        </p:spPr>
+        <p:style>
+          <a:lnRef idx="2">
+            <a:schemeClr val="accent1"/>
+          </a:lnRef>
+          <a:fillRef idx="0">
+            <a:schemeClr val="accent1"/>
+          </a:fillRef>
+          <a:effectRef idx="1">
+            <a:schemeClr val="accent1"/>
+          </a:effectRef>
+          <a:fontRef idx="minor">
+            <a:schemeClr val="tx1"/>
+          </a:fontRef>
+        </p:style>
+      </p:cxnSp>
       <p:grpSp>
         <p:nvGrpSpPr>
           <p:cNvPr id="9" name="Group 8">
@@ -3709,10 +3752,10 @@
       </p:sp>
       <p:sp>
         <p:nvSpPr>
-          <p:cNvPr id="12" name="Rectangle 11">
-            <a:extLst>
-              <a:ext uri="{FF2B5EF4-FFF2-40B4-BE49-F238E27FC236}">
-                <a16:creationId xmlns:a16="http://schemas.microsoft.com/office/drawing/2014/main" id="{C7E8C7CF-3CAA-3187-F346-57149963FE71}"/>
+          <p:cNvPr id="13" name="Rectangle 12">
+            <a:extLst>
+              <a:ext uri="{FF2B5EF4-FFF2-40B4-BE49-F238E27FC236}">
+                <a16:creationId xmlns:a16="http://schemas.microsoft.com/office/drawing/2014/main" id="{D31C07DF-100E-C533-0902-7845E6BF6544}"/>
               </a:ext>
             </a:extLst>
           </p:cNvPr>
@@ -3721,8 +3764,8 @@
         </p:nvSpPr>
         <p:spPr>
           <a:xfrm>
-            <a:off x="5041560" y="2913177"/>
-            <a:ext cx="495300" cy="457200"/>
+            <a:off x="5628687" y="2531440"/>
+            <a:ext cx="846281" cy="763473"/>
           </a:xfrm>
           <a:prstGeom prst="rect">
             <a:avLst/>
@@ -3756,2077 +3799,6 @@
           </a:p>
         </p:txBody>
       </p:sp>
-      <p:sp>
-        <p:nvSpPr>
-          <p:cNvPr id="13" name="Rectangle 12">
-            <a:extLst>
-              <a:ext uri="{FF2B5EF4-FFF2-40B4-BE49-F238E27FC236}">
-                <a16:creationId xmlns:a16="http://schemas.microsoft.com/office/drawing/2014/main" id="{D31C07DF-100E-C533-0902-7845E6BF6544}"/>
-              </a:ext>
-            </a:extLst>
-          </p:cNvPr>
-          <p:cNvSpPr/>
-          <p:nvPr/>
-        </p:nvSpPr>
-        <p:spPr>
-          <a:xfrm>
-            <a:off x="5656121" y="2913177"/>
-            <a:ext cx="495300" cy="457200"/>
-          </a:xfrm>
-          <a:prstGeom prst="rect">
-            <a:avLst/>
-          </a:prstGeom>
-          <a:solidFill>
-            <a:schemeClr val="bg1"/>
-          </a:solidFill>
-        </p:spPr>
-        <p:style>
-          <a:lnRef idx="2">
-            <a:schemeClr val="accent1">
-              <a:shade val="15000"/>
-            </a:schemeClr>
-          </a:lnRef>
-          <a:fillRef idx="1">
-            <a:schemeClr val="accent1"/>
-          </a:fillRef>
-          <a:effectRef idx="0">
-            <a:schemeClr val="accent1"/>
-          </a:effectRef>
-          <a:fontRef idx="minor">
-            <a:schemeClr val="lt1"/>
-          </a:fontRef>
-        </p:style>
-        <p:txBody>
-          <a:bodyPr rtlCol="0" anchor="ctr"/>
-          <a:lstStyle/>
-          <a:p>
-            <a:pPr algn="ctr"/>
-            <a:endParaRPr lang="en-CA"/>
-          </a:p>
-        </p:txBody>
-      </p:sp>
-      <p:sp>
-        <p:nvSpPr>
-          <p:cNvPr id="14" name="Rectangle 13">
-            <a:extLst>
-              <a:ext uri="{FF2B5EF4-FFF2-40B4-BE49-F238E27FC236}">
-                <a16:creationId xmlns:a16="http://schemas.microsoft.com/office/drawing/2014/main" id="{D5E7CC2B-B289-6ED0-B6BE-34695E197384}"/>
-              </a:ext>
-            </a:extLst>
-          </p:cNvPr>
-          <p:cNvSpPr/>
-          <p:nvPr/>
-        </p:nvSpPr>
-        <p:spPr>
-          <a:xfrm>
-            <a:off x="5041560" y="3422189"/>
-            <a:ext cx="495300" cy="457200"/>
-          </a:xfrm>
-          <a:prstGeom prst="rect">
-            <a:avLst/>
-          </a:prstGeom>
-          <a:solidFill>
-            <a:schemeClr val="bg1"/>
-          </a:solidFill>
-        </p:spPr>
-        <p:style>
-          <a:lnRef idx="2">
-            <a:schemeClr val="accent1">
-              <a:shade val="15000"/>
-            </a:schemeClr>
-          </a:lnRef>
-          <a:fillRef idx="1">
-            <a:schemeClr val="accent1"/>
-          </a:fillRef>
-          <a:effectRef idx="0">
-            <a:schemeClr val="accent1"/>
-          </a:effectRef>
-          <a:fontRef idx="minor">
-            <a:schemeClr val="lt1"/>
-          </a:fontRef>
-        </p:style>
-        <p:txBody>
-          <a:bodyPr rtlCol="0" anchor="ctr"/>
-          <a:lstStyle/>
-          <a:p>
-            <a:pPr algn="ctr"/>
-            <a:endParaRPr lang="en-CA"/>
-          </a:p>
-        </p:txBody>
-      </p:sp>
-      <p:sp>
-        <p:nvSpPr>
-          <p:cNvPr id="15" name="Rectangle 14">
-            <a:extLst>
-              <a:ext uri="{FF2B5EF4-FFF2-40B4-BE49-F238E27FC236}">
-                <a16:creationId xmlns:a16="http://schemas.microsoft.com/office/drawing/2014/main" id="{DEDAA8A3-1E5B-648A-EB69-4BC57537725D}"/>
-              </a:ext>
-            </a:extLst>
-          </p:cNvPr>
-          <p:cNvSpPr/>
-          <p:nvPr/>
-        </p:nvSpPr>
-        <p:spPr>
-          <a:xfrm>
-            <a:off x="5656121" y="3422189"/>
-            <a:ext cx="495300" cy="457200"/>
-          </a:xfrm>
-          <a:prstGeom prst="rect">
-            <a:avLst/>
-          </a:prstGeom>
-          <a:solidFill>
-            <a:schemeClr val="bg1"/>
-          </a:solidFill>
-        </p:spPr>
-        <p:style>
-          <a:lnRef idx="2">
-            <a:schemeClr val="accent1">
-              <a:shade val="15000"/>
-            </a:schemeClr>
-          </a:lnRef>
-          <a:fillRef idx="1">
-            <a:schemeClr val="accent1"/>
-          </a:fillRef>
-          <a:effectRef idx="0">
-            <a:schemeClr val="accent1"/>
-          </a:effectRef>
-          <a:fontRef idx="minor">
-            <a:schemeClr val="lt1"/>
-          </a:fontRef>
-        </p:style>
-        <p:txBody>
-          <a:bodyPr rtlCol="0" anchor="ctr"/>
-          <a:lstStyle/>
-          <a:p>
-            <a:pPr algn="ctr"/>
-            <a:endParaRPr lang="en-CA"/>
-          </a:p>
-        </p:txBody>
-      </p:sp>
-      <p:sp>
-        <p:nvSpPr>
-          <p:cNvPr id="16" name="Rectangle 15">
-            <a:extLst>
-              <a:ext uri="{FF2B5EF4-FFF2-40B4-BE49-F238E27FC236}">
-                <a16:creationId xmlns:a16="http://schemas.microsoft.com/office/drawing/2014/main" id="{539AC4B2-119C-674D-A785-642B328110BD}"/>
-              </a:ext>
-            </a:extLst>
-          </p:cNvPr>
-          <p:cNvSpPr/>
-          <p:nvPr/>
-        </p:nvSpPr>
-        <p:spPr>
-          <a:xfrm>
-            <a:off x="5041560" y="3931201"/>
-            <a:ext cx="495300" cy="457200"/>
-          </a:xfrm>
-          <a:prstGeom prst="rect">
-            <a:avLst/>
-          </a:prstGeom>
-          <a:solidFill>
-            <a:schemeClr val="bg1"/>
-          </a:solidFill>
-        </p:spPr>
-        <p:style>
-          <a:lnRef idx="2">
-            <a:schemeClr val="accent1">
-              <a:shade val="15000"/>
-            </a:schemeClr>
-          </a:lnRef>
-          <a:fillRef idx="1">
-            <a:schemeClr val="accent1"/>
-          </a:fillRef>
-          <a:effectRef idx="0">
-            <a:schemeClr val="accent1"/>
-          </a:effectRef>
-          <a:fontRef idx="minor">
-            <a:schemeClr val="lt1"/>
-          </a:fontRef>
-        </p:style>
-        <p:txBody>
-          <a:bodyPr rtlCol="0" anchor="ctr"/>
-          <a:lstStyle/>
-          <a:p>
-            <a:pPr algn="ctr"/>
-            <a:endParaRPr lang="en-CA"/>
-          </a:p>
-        </p:txBody>
-      </p:sp>
-      <p:sp>
-        <p:nvSpPr>
-          <p:cNvPr id="17" name="Rectangle 16">
-            <a:extLst>
-              <a:ext uri="{FF2B5EF4-FFF2-40B4-BE49-F238E27FC236}">
-                <a16:creationId xmlns:a16="http://schemas.microsoft.com/office/drawing/2014/main" id="{B09677B9-2ECB-B5F4-6E61-F40BD06EC844}"/>
-              </a:ext>
-            </a:extLst>
-          </p:cNvPr>
-          <p:cNvSpPr/>
-          <p:nvPr/>
-        </p:nvSpPr>
-        <p:spPr>
-          <a:xfrm>
-            <a:off x="5656121" y="3931201"/>
-            <a:ext cx="495300" cy="457200"/>
-          </a:xfrm>
-          <a:prstGeom prst="rect">
-            <a:avLst/>
-          </a:prstGeom>
-          <a:solidFill>
-            <a:schemeClr val="bg1"/>
-          </a:solidFill>
-        </p:spPr>
-        <p:style>
-          <a:lnRef idx="2">
-            <a:schemeClr val="accent1">
-              <a:shade val="15000"/>
-            </a:schemeClr>
-          </a:lnRef>
-          <a:fillRef idx="1">
-            <a:schemeClr val="accent1"/>
-          </a:fillRef>
-          <a:effectRef idx="0">
-            <a:schemeClr val="accent1"/>
-          </a:effectRef>
-          <a:fontRef idx="minor">
-            <a:schemeClr val="lt1"/>
-          </a:fontRef>
-        </p:style>
-        <p:txBody>
-          <a:bodyPr rtlCol="0" anchor="ctr"/>
-          <a:lstStyle/>
-          <a:p>
-            <a:pPr algn="ctr"/>
-            <a:endParaRPr lang="en-CA"/>
-          </a:p>
-        </p:txBody>
-      </p:sp>
-      <p:sp>
-        <p:nvSpPr>
-          <p:cNvPr id="18" name="Rectangle 17">
-            <a:extLst>
-              <a:ext uri="{FF2B5EF4-FFF2-40B4-BE49-F238E27FC236}">
-                <a16:creationId xmlns:a16="http://schemas.microsoft.com/office/drawing/2014/main" id="{EFC656F5-A636-189E-D1EB-5A01D67D0052}"/>
-              </a:ext>
-            </a:extLst>
-          </p:cNvPr>
-          <p:cNvSpPr/>
-          <p:nvPr/>
-        </p:nvSpPr>
-        <p:spPr>
-          <a:xfrm>
-            <a:off x="5041560" y="4469145"/>
-            <a:ext cx="495300" cy="457200"/>
-          </a:xfrm>
-          <a:prstGeom prst="rect">
-            <a:avLst/>
-          </a:prstGeom>
-          <a:solidFill>
-            <a:schemeClr val="bg1"/>
-          </a:solidFill>
-        </p:spPr>
-        <p:style>
-          <a:lnRef idx="2">
-            <a:schemeClr val="accent1">
-              <a:shade val="15000"/>
-            </a:schemeClr>
-          </a:lnRef>
-          <a:fillRef idx="1">
-            <a:schemeClr val="accent1"/>
-          </a:fillRef>
-          <a:effectRef idx="0">
-            <a:schemeClr val="accent1"/>
-          </a:effectRef>
-          <a:fontRef idx="minor">
-            <a:schemeClr val="lt1"/>
-          </a:fontRef>
-        </p:style>
-        <p:txBody>
-          <a:bodyPr rtlCol="0" anchor="ctr"/>
-          <a:lstStyle/>
-          <a:p>
-            <a:pPr algn="ctr"/>
-            <a:endParaRPr lang="en-CA"/>
-          </a:p>
-        </p:txBody>
-      </p:sp>
-      <p:sp>
-        <p:nvSpPr>
-          <p:cNvPr id="19" name="Rectangle 18">
-            <a:extLst>
-              <a:ext uri="{FF2B5EF4-FFF2-40B4-BE49-F238E27FC236}">
-                <a16:creationId xmlns:a16="http://schemas.microsoft.com/office/drawing/2014/main" id="{98995BDD-5F6F-D06D-D14D-118311DD1818}"/>
-              </a:ext>
-            </a:extLst>
-          </p:cNvPr>
-          <p:cNvSpPr/>
-          <p:nvPr/>
-        </p:nvSpPr>
-        <p:spPr>
-          <a:xfrm>
-            <a:off x="5656121" y="4469145"/>
-            <a:ext cx="495300" cy="457200"/>
-          </a:xfrm>
-          <a:prstGeom prst="rect">
-            <a:avLst/>
-          </a:prstGeom>
-          <a:solidFill>
-            <a:schemeClr val="bg1"/>
-          </a:solidFill>
-        </p:spPr>
-        <p:style>
-          <a:lnRef idx="2">
-            <a:schemeClr val="accent1">
-              <a:shade val="15000"/>
-            </a:schemeClr>
-          </a:lnRef>
-          <a:fillRef idx="1">
-            <a:schemeClr val="accent1"/>
-          </a:fillRef>
-          <a:effectRef idx="0">
-            <a:schemeClr val="accent1"/>
-          </a:effectRef>
-          <a:fontRef idx="minor">
-            <a:schemeClr val="lt1"/>
-          </a:fontRef>
-        </p:style>
-        <p:txBody>
-          <a:bodyPr rtlCol="0" anchor="ctr"/>
-          <a:lstStyle/>
-          <a:p>
-            <a:pPr algn="ctr"/>
-            <a:endParaRPr lang="en-CA"/>
-          </a:p>
-        </p:txBody>
-      </p:sp>
-      <p:pic>
-        <p:nvPicPr>
-          <p:cNvPr id="22" name="Graphic 21" descr="Ant outline">
-            <a:extLst>
-              <a:ext uri="{FF2B5EF4-FFF2-40B4-BE49-F238E27FC236}">
-                <a16:creationId xmlns:a16="http://schemas.microsoft.com/office/drawing/2014/main" id="{C12FFE18-2427-74FD-5AB1-905655EE1EC3}"/>
-              </a:ext>
-            </a:extLst>
-          </p:cNvPr>
-          <p:cNvPicPr>
-            <a:picLocks noChangeAspect="1"/>
-          </p:cNvPicPr>
-          <p:nvPr/>
-        </p:nvPicPr>
-        <p:blipFill>
-          <a:blip r:embed="rId2">
-            <a:extLst>
-              <a:ext uri="{96DAC541-7B7A-43D3-8B79-37D633B846F1}">
-                <asvg:svgBlip xmlns:asvg="http://schemas.microsoft.com/office/drawing/2016/SVG/main" r:embed="rId3"/>
-              </a:ext>
-            </a:extLst>
-          </a:blip>
-          <a:stretch>
-            <a:fillRect/>
-          </a:stretch>
-        </p:blipFill>
-        <p:spPr>
-          <a:xfrm>
-            <a:off x="5112032" y="2956693"/>
-            <a:ext cx="214313" cy="214313"/>
-          </a:xfrm>
-          <a:prstGeom prst="rect">
-            <a:avLst/>
-          </a:prstGeom>
-        </p:spPr>
-      </p:pic>
-      <p:pic>
-        <p:nvPicPr>
-          <p:cNvPr id="23" name="Graphic 22" descr="Ant outline">
-            <a:extLst>
-              <a:ext uri="{FF2B5EF4-FFF2-40B4-BE49-F238E27FC236}">
-                <a16:creationId xmlns:a16="http://schemas.microsoft.com/office/drawing/2014/main" id="{B71F3169-E20C-E4A6-DC4F-CB3975118F48}"/>
-              </a:ext>
-            </a:extLst>
-          </p:cNvPr>
-          <p:cNvPicPr>
-            <a:picLocks noChangeAspect="1"/>
-          </p:cNvPicPr>
-          <p:nvPr/>
-        </p:nvPicPr>
-        <p:blipFill>
-          <a:blip r:embed="rId2">
-            <a:extLst>
-              <a:ext uri="{96DAC541-7B7A-43D3-8B79-37D633B846F1}">
-                <asvg:svgBlip xmlns:asvg="http://schemas.microsoft.com/office/drawing/2016/SVG/main" r:embed="rId3"/>
-              </a:ext>
-            </a:extLst>
-          </a:blip>
-          <a:stretch>
-            <a:fillRect/>
-          </a:stretch>
-        </p:blipFill>
-        <p:spPr>
-          <a:xfrm>
-            <a:off x="5142678" y="3094588"/>
-            <a:ext cx="214313" cy="214313"/>
-          </a:xfrm>
-          <a:prstGeom prst="rect">
-            <a:avLst/>
-          </a:prstGeom>
-        </p:spPr>
-      </p:pic>
-      <p:pic>
-        <p:nvPicPr>
-          <p:cNvPr id="24" name="Graphic 23" descr="Ant outline">
-            <a:extLst>
-              <a:ext uri="{FF2B5EF4-FFF2-40B4-BE49-F238E27FC236}">
-                <a16:creationId xmlns:a16="http://schemas.microsoft.com/office/drawing/2014/main" id="{1BE12628-4462-0DDC-25C4-FAABA1261B25}"/>
-              </a:ext>
-            </a:extLst>
-          </p:cNvPr>
-          <p:cNvPicPr>
-            <a:picLocks noChangeAspect="1"/>
-          </p:cNvPicPr>
-          <p:nvPr/>
-        </p:nvPicPr>
-        <p:blipFill>
-          <a:blip r:embed="rId2">
-            <a:extLst>
-              <a:ext uri="{96DAC541-7B7A-43D3-8B79-37D633B846F1}">
-                <asvg:svgBlip xmlns:asvg="http://schemas.microsoft.com/office/drawing/2016/SVG/main" r:embed="rId3"/>
-              </a:ext>
-            </a:extLst>
-          </a:blip>
-          <a:stretch>
-            <a:fillRect/>
-          </a:stretch>
-        </p:blipFill>
-        <p:spPr>
-          <a:xfrm>
-            <a:off x="5227494" y="2987432"/>
-            <a:ext cx="214313" cy="214313"/>
-          </a:xfrm>
-          <a:prstGeom prst="rect">
-            <a:avLst/>
-          </a:prstGeom>
-        </p:spPr>
-      </p:pic>
-      <p:pic>
-        <p:nvPicPr>
-          <p:cNvPr id="26" name="Graphic 25" descr="Ant outline">
-            <a:extLst>
-              <a:ext uri="{FF2B5EF4-FFF2-40B4-BE49-F238E27FC236}">
-                <a16:creationId xmlns:a16="http://schemas.microsoft.com/office/drawing/2014/main" id="{C4F57C08-F530-3C78-3C29-1AD87BF15BC8}"/>
-              </a:ext>
-            </a:extLst>
-          </p:cNvPr>
-          <p:cNvPicPr>
-            <a:picLocks noChangeAspect="1"/>
-          </p:cNvPicPr>
-          <p:nvPr/>
-        </p:nvPicPr>
-        <p:blipFill>
-          <a:blip r:embed="rId2">
-            <a:extLst>
-              <a:ext uri="{96DAC541-7B7A-43D3-8B79-37D633B846F1}">
-                <asvg:svgBlip xmlns:asvg="http://schemas.microsoft.com/office/drawing/2016/SVG/main" r:embed="rId3"/>
-              </a:ext>
-            </a:extLst>
-          </a:blip>
-          <a:stretch>
-            <a:fillRect/>
-          </a:stretch>
-        </p:blipFill>
-        <p:spPr>
-          <a:xfrm>
-            <a:off x="5027371" y="3156064"/>
-            <a:ext cx="214313" cy="214313"/>
-          </a:xfrm>
-          <a:prstGeom prst="rect">
-            <a:avLst/>
-          </a:prstGeom>
-        </p:spPr>
-      </p:pic>
-      <p:pic>
-        <p:nvPicPr>
-          <p:cNvPr id="27" name="Graphic 26" descr="Ant outline">
-            <a:extLst>
-              <a:ext uri="{FF2B5EF4-FFF2-40B4-BE49-F238E27FC236}">
-                <a16:creationId xmlns:a16="http://schemas.microsoft.com/office/drawing/2014/main" id="{BDEE3AB8-9EDB-BF14-A487-B79B88888F30}"/>
-              </a:ext>
-            </a:extLst>
-          </p:cNvPr>
-          <p:cNvPicPr>
-            <a:picLocks noChangeAspect="1"/>
-          </p:cNvPicPr>
-          <p:nvPr/>
-        </p:nvPicPr>
-        <p:blipFill>
-          <a:blip r:embed="rId2">
-            <a:extLst>
-              <a:ext uri="{96DAC541-7B7A-43D3-8B79-37D633B846F1}">
-                <asvg:svgBlip xmlns:asvg="http://schemas.microsoft.com/office/drawing/2016/SVG/main" r:embed="rId3"/>
-              </a:ext>
-            </a:extLst>
-          </a:blip>
-          <a:stretch>
-            <a:fillRect/>
-          </a:stretch>
-        </p:blipFill>
-        <p:spPr>
-          <a:xfrm>
-            <a:off x="5325307" y="2925955"/>
-            <a:ext cx="214313" cy="214313"/>
-          </a:xfrm>
-          <a:prstGeom prst="rect">
-            <a:avLst/>
-          </a:prstGeom>
-        </p:spPr>
-      </p:pic>
-      <p:pic>
-        <p:nvPicPr>
-          <p:cNvPr id="28" name="Graphic 27" descr="Ant outline">
-            <a:extLst>
-              <a:ext uri="{FF2B5EF4-FFF2-40B4-BE49-F238E27FC236}">
-                <a16:creationId xmlns:a16="http://schemas.microsoft.com/office/drawing/2014/main" id="{D8537A3E-058C-8EA9-791F-B65CC1A63156}"/>
-              </a:ext>
-            </a:extLst>
-          </p:cNvPr>
-          <p:cNvPicPr>
-            <a:picLocks noChangeAspect="1"/>
-          </p:cNvPicPr>
-          <p:nvPr/>
-        </p:nvPicPr>
-        <p:blipFill>
-          <a:blip r:embed="rId4">
-            <a:extLst>
-              <a:ext uri="{96DAC541-7B7A-43D3-8B79-37D633B846F1}">
-                <asvg:svgBlip xmlns:asvg="http://schemas.microsoft.com/office/drawing/2016/SVG/main" r:embed="rId5"/>
-              </a:ext>
-            </a:extLst>
-          </a:blip>
-          <a:stretch>
-            <a:fillRect/>
-          </a:stretch>
-        </p:blipFill>
-        <p:spPr>
-          <a:xfrm>
-            <a:off x="5737201" y="2956693"/>
-            <a:ext cx="214313" cy="214313"/>
-          </a:xfrm>
-          <a:prstGeom prst="rect">
-            <a:avLst/>
-          </a:prstGeom>
-        </p:spPr>
-      </p:pic>
-      <p:pic>
-        <p:nvPicPr>
-          <p:cNvPr id="29" name="Graphic 28" descr="Ant outline">
-            <a:extLst>
-              <a:ext uri="{FF2B5EF4-FFF2-40B4-BE49-F238E27FC236}">
-                <a16:creationId xmlns:a16="http://schemas.microsoft.com/office/drawing/2014/main" id="{32A1BF48-C9E7-140E-4DDE-8D50CFED7480}"/>
-              </a:ext>
-            </a:extLst>
-          </p:cNvPr>
-          <p:cNvPicPr>
-            <a:picLocks noChangeAspect="1"/>
-          </p:cNvPicPr>
-          <p:nvPr/>
-        </p:nvPicPr>
-        <p:blipFill>
-          <a:blip r:embed="rId4">
-            <a:extLst>
-              <a:ext uri="{96DAC541-7B7A-43D3-8B79-37D633B846F1}">
-                <asvg:svgBlip xmlns:asvg="http://schemas.microsoft.com/office/drawing/2016/SVG/main" r:embed="rId5"/>
-              </a:ext>
-            </a:extLst>
-          </a:blip>
-          <a:stretch>
-            <a:fillRect/>
-          </a:stretch>
-        </p:blipFill>
-        <p:spPr>
-          <a:xfrm>
-            <a:off x="5767847" y="3094588"/>
-            <a:ext cx="214313" cy="214313"/>
-          </a:xfrm>
-          <a:prstGeom prst="rect">
-            <a:avLst/>
-          </a:prstGeom>
-        </p:spPr>
-      </p:pic>
-      <p:pic>
-        <p:nvPicPr>
-          <p:cNvPr id="30" name="Graphic 29" descr="Ant outline">
-            <a:extLst>
-              <a:ext uri="{FF2B5EF4-FFF2-40B4-BE49-F238E27FC236}">
-                <a16:creationId xmlns:a16="http://schemas.microsoft.com/office/drawing/2014/main" id="{15F25B56-40F7-8EA4-73CF-69E863CE87AD}"/>
-              </a:ext>
-            </a:extLst>
-          </p:cNvPr>
-          <p:cNvPicPr>
-            <a:picLocks noChangeAspect="1"/>
-          </p:cNvPicPr>
-          <p:nvPr/>
-        </p:nvPicPr>
-        <p:blipFill>
-          <a:blip r:embed="rId4">
-            <a:extLst>
-              <a:ext uri="{96DAC541-7B7A-43D3-8B79-37D633B846F1}">
-                <asvg:svgBlip xmlns:asvg="http://schemas.microsoft.com/office/drawing/2016/SVG/main" r:embed="rId5"/>
-              </a:ext>
-            </a:extLst>
-          </a:blip>
-          <a:stretch>
-            <a:fillRect/>
-          </a:stretch>
-        </p:blipFill>
-        <p:spPr>
-          <a:xfrm>
-            <a:off x="5852663" y="2987432"/>
-            <a:ext cx="214313" cy="214313"/>
-          </a:xfrm>
-          <a:prstGeom prst="rect">
-            <a:avLst/>
-          </a:prstGeom>
-        </p:spPr>
-      </p:pic>
-      <p:pic>
-        <p:nvPicPr>
-          <p:cNvPr id="31" name="Graphic 30" descr="Ant outline">
-            <a:extLst>
-              <a:ext uri="{FF2B5EF4-FFF2-40B4-BE49-F238E27FC236}">
-                <a16:creationId xmlns:a16="http://schemas.microsoft.com/office/drawing/2014/main" id="{F7FD79F1-1A87-0FC2-F2D4-0F80D2621D04}"/>
-              </a:ext>
-            </a:extLst>
-          </p:cNvPr>
-          <p:cNvPicPr>
-            <a:picLocks noChangeAspect="1"/>
-          </p:cNvPicPr>
-          <p:nvPr/>
-        </p:nvPicPr>
-        <p:blipFill>
-          <a:blip r:embed="rId4">
-            <a:extLst>
-              <a:ext uri="{96DAC541-7B7A-43D3-8B79-37D633B846F1}">
-                <asvg:svgBlip xmlns:asvg="http://schemas.microsoft.com/office/drawing/2016/SVG/main" r:embed="rId5"/>
-              </a:ext>
-            </a:extLst>
-          </a:blip>
-          <a:stretch>
-            <a:fillRect/>
-          </a:stretch>
-        </p:blipFill>
-        <p:spPr>
-          <a:xfrm>
-            <a:off x="5902950" y="3128309"/>
-            <a:ext cx="214313" cy="214313"/>
-          </a:xfrm>
-          <a:prstGeom prst="rect">
-            <a:avLst/>
-          </a:prstGeom>
-        </p:spPr>
-      </p:pic>
-      <p:pic>
-        <p:nvPicPr>
-          <p:cNvPr id="32" name="Graphic 31" descr="Ant outline">
-            <a:extLst>
-              <a:ext uri="{FF2B5EF4-FFF2-40B4-BE49-F238E27FC236}">
-                <a16:creationId xmlns:a16="http://schemas.microsoft.com/office/drawing/2014/main" id="{3E343A4B-846A-0E17-3B17-86C0EE494B2A}"/>
-              </a:ext>
-            </a:extLst>
-          </p:cNvPr>
-          <p:cNvPicPr>
-            <a:picLocks noChangeAspect="1"/>
-          </p:cNvPicPr>
-          <p:nvPr/>
-        </p:nvPicPr>
-        <p:blipFill>
-          <a:blip r:embed="rId4">
-            <a:extLst>
-              <a:ext uri="{96DAC541-7B7A-43D3-8B79-37D633B846F1}">
-                <asvg:svgBlip xmlns:asvg="http://schemas.microsoft.com/office/drawing/2016/SVG/main" r:embed="rId5"/>
-              </a:ext>
-            </a:extLst>
-          </a:blip>
-          <a:stretch>
-            <a:fillRect/>
-          </a:stretch>
-        </p:blipFill>
-        <p:spPr>
-          <a:xfrm>
-            <a:off x="5652540" y="3156064"/>
-            <a:ext cx="214313" cy="214313"/>
-          </a:xfrm>
-          <a:prstGeom prst="rect">
-            <a:avLst/>
-          </a:prstGeom>
-        </p:spPr>
-      </p:pic>
-      <p:pic>
-        <p:nvPicPr>
-          <p:cNvPr id="33" name="Graphic 32" descr="Ant outline">
-            <a:extLst>
-              <a:ext uri="{FF2B5EF4-FFF2-40B4-BE49-F238E27FC236}">
-                <a16:creationId xmlns:a16="http://schemas.microsoft.com/office/drawing/2014/main" id="{16A46780-E9EA-EFB8-3861-FCF4B7A4ED6C}"/>
-              </a:ext>
-            </a:extLst>
-          </p:cNvPr>
-          <p:cNvPicPr>
-            <a:picLocks noChangeAspect="1"/>
-          </p:cNvPicPr>
-          <p:nvPr/>
-        </p:nvPicPr>
-        <p:blipFill>
-          <a:blip r:embed="rId4">
-            <a:extLst>
-              <a:ext uri="{96DAC541-7B7A-43D3-8B79-37D633B846F1}">
-                <asvg:svgBlip xmlns:asvg="http://schemas.microsoft.com/office/drawing/2016/SVG/main" r:embed="rId5"/>
-              </a:ext>
-            </a:extLst>
-          </a:blip>
-          <a:stretch>
-            <a:fillRect/>
-          </a:stretch>
-        </p:blipFill>
-        <p:spPr>
-          <a:xfrm>
-            <a:off x="5950476" y="2925955"/>
-            <a:ext cx="214313" cy="214313"/>
-          </a:xfrm>
-          <a:prstGeom prst="rect">
-            <a:avLst/>
-          </a:prstGeom>
-        </p:spPr>
-      </p:pic>
-      <p:pic>
-        <p:nvPicPr>
-          <p:cNvPr id="34" name="Graphic 33" descr="Ant outline">
-            <a:extLst>
-              <a:ext uri="{FF2B5EF4-FFF2-40B4-BE49-F238E27FC236}">
-                <a16:creationId xmlns:a16="http://schemas.microsoft.com/office/drawing/2014/main" id="{A910AEB9-B9F7-F231-D163-90C1EAEAA49D}"/>
-              </a:ext>
-            </a:extLst>
-          </p:cNvPr>
-          <p:cNvPicPr>
-            <a:picLocks noChangeAspect="1"/>
-          </p:cNvPicPr>
-          <p:nvPr/>
-        </p:nvPicPr>
-        <p:blipFill>
-          <a:blip r:embed="rId6">
-            <a:extLst>
-              <a:ext uri="{96DAC541-7B7A-43D3-8B79-37D633B846F1}">
-                <asvg:svgBlip xmlns:asvg="http://schemas.microsoft.com/office/drawing/2016/SVG/main" r:embed="rId7"/>
-              </a:ext>
-            </a:extLst>
-          </a:blip>
-          <a:stretch>
-            <a:fillRect/>
-          </a:stretch>
-        </p:blipFill>
-        <p:spPr>
-          <a:xfrm>
-            <a:off x="5109365" y="3464258"/>
-            <a:ext cx="214313" cy="214313"/>
-          </a:xfrm>
-          <a:prstGeom prst="rect">
-            <a:avLst/>
-          </a:prstGeom>
-        </p:spPr>
-      </p:pic>
-      <p:pic>
-        <p:nvPicPr>
-          <p:cNvPr id="35" name="Graphic 34" descr="Ant outline">
-            <a:extLst>
-              <a:ext uri="{FF2B5EF4-FFF2-40B4-BE49-F238E27FC236}">
-                <a16:creationId xmlns:a16="http://schemas.microsoft.com/office/drawing/2014/main" id="{2FC9472F-6DD9-F415-899D-D475B6CDFE6F}"/>
-              </a:ext>
-            </a:extLst>
-          </p:cNvPr>
-          <p:cNvPicPr>
-            <a:picLocks noChangeAspect="1"/>
-          </p:cNvPicPr>
-          <p:nvPr/>
-        </p:nvPicPr>
-        <p:blipFill>
-          <a:blip r:embed="rId6">
-            <a:extLst>
-              <a:ext uri="{96DAC541-7B7A-43D3-8B79-37D633B846F1}">
-                <asvg:svgBlip xmlns:asvg="http://schemas.microsoft.com/office/drawing/2016/SVG/main" r:embed="rId7"/>
-              </a:ext>
-            </a:extLst>
-          </a:blip>
-          <a:stretch>
-            <a:fillRect/>
-          </a:stretch>
-        </p:blipFill>
-        <p:spPr>
-          <a:xfrm>
-            <a:off x="5140011" y="3602153"/>
-            <a:ext cx="214313" cy="214313"/>
-          </a:xfrm>
-          <a:prstGeom prst="rect">
-            <a:avLst/>
-          </a:prstGeom>
-        </p:spPr>
-      </p:pic>
-      <p:pic>
-        <p:nvPicPr>
-          <p:cNvPr id="36" name="Graphic 35" descr="Ant outline">
-            <a:extLst>
-              <a:ext uri="{FF2B5EF4-FFF2-40B4-BE49-F238E27FC236}">
-                <a16:creationId xmlns:a16="http://schemas.microsoft.com/office/drawing/2014/main" id="{F0E23454-3F73-D89A-D514-7187DAC99FDF}"/>
-              </a:ext>
-            </a:extLst>
-          </p:cNvPr>
-          <p:cNvPicPr>
-            <a:picLocks noChangeAspect="1"/>
-          </p:cNvPicPr>
-          <p:nvPr/>
-        </p:nvPicPr>
-        <p:blipFill>
-          <a:blip r:embed="rId6">
-            <a:extLst>
-              <a:ext uri="{96DAC541-7B7A-43D3-8B79-37D633B846F1}">
-                <asvg:svgBlip xmlns:asvg="http://schemas.microsoft.com/office/drawing/2016/SVG/main" r:embed="rId7"/>
-              </a:ext>
-            </a:extLst>
-          </a:blip>
-          <a:stretch>
-            <a:fillRect/>
-          </a:stretch>
-        </p:blipFill>
-        <p:spPr>
-          <a:xfrm>
-            <a:off x="5224827" y="3494997"/>
-            <a:ext cx="214313" cy="214313"/>
-          </a:xfrm>
-          <a:prstGeom prst="rect">
-            <a:avLst/>
-          </a:prstGeom>
-        </p:spPr>
-      </p:pic>
-      <p:pic>
-        <p:nvPicPr>
-          <p:cNvPr id="37" name="Graphic 36" descr="Ant outline">
-            <a:extLst>
-              <a:ext uri="{FF2B5EF4-FFF2-40B4-BE49-F238E27FC236}">
-                <a16:creationId xmlns:a16="http://schemas.microsoft.com/office/drawing/2014/main" id="{20F2F642-4EE4-B17C-6B24-348BFA23FABE}"/>
-              </a:ext>
-            </a:extLst>
-          </p:cNvPr>
-          <p:cNvPicPr>
-            <a:picLocks noChangeAspect="1"/>
-          </p:cNvPicPr>
-          <p:nvPr/>
-        </p:nvPicPr>
-        <p:blipFill>
-          <a:blip r:embed="rId6">
-            <a:extLst>
-              <a:ext uri="{96DAC541-7B7A-43D3-8B79-37D633B846F1}">
-                <asvg:svgBlip xmlns:asvg="http://schemas.microsoft.com/office/drawing/2016/SVG/main" r:embed="rId7"/>
-              </a:ext>
-            </a:extLst>
-          </a:blip>
-          <a:stretch>
-            <a:fillRect/>
-          </a:stretch>
-        </p:blipFill>
-        <p:spPr>
-          <a:xfrm>
-            <a:off x="5275114" y="3635874"/>
-            <a:ext cx="214313" cy="214313"/>
-          </a:xfrm>
-          <a:prstGeom prst="rect">
-            <a:avLst/>
-          </a:prstGeom>
-        </p:spPr>
-      </p:pic>
-      <p:pic>
-        <p:nvPicPr>
-          <p:cNvPr id="38" name="Graphic 37" descr="Ant outline">
-            <a:extLst>
-              <a:ext uri="{FF2B5EF4-FFF2-40B4-BE49-F238E27FC236}">
-                <a16:creationId xmlns:a16="http://schemas.microsoft.com/office/drawing/2014/main" id="{88209ED4-24D5-59B9-7AC4-7E795E51822F}"/>
-              </a:ext>
-            </a:extLst>
-          </p:cNvPr>
-          <p:cNvPicPr>
-            <a:picLocks noChangeAspect="1"/>
-          </p:cNvPicPr>
-          <p:nvPr/>
-        </p:nvPicPr>
-        <p:blipFill>
-          <a:blip r:embed="rId6">
-            <a:extLst>
-              <a:ext uri="{96DAC541-7B7A-43D3-8B79-37D633B846F1}">
-                <asvg:svgBlip xmlns:asvg="http://schemas.microsoft.com/office/drawing/2016/SVG/main" r:embed="rId7"/>
-              </a:ext>
-            </a:extLst>
-          </a:blip>
-          <a:stretch>
-            <a:fillRect/>
-          </a:stretch>
-        </p:blipFill>
-        <p:spPr>
-          <a:xfrm>
-            <a:off x="5024704" y="3663629"/>
-            <a:ext cx="214313" cy="214313"/>
-          </a:xfrm>
-          <a:prstGeom prst="rect">
-            <a:avLst/>
-          </a:prstGeom>
-        </p:spPr>
-      </p:pic>
-      <p:pic>
-        <p:nvPicPr>
-          <p:cNvPr id="39" name="Graphic 38" descr="Ant outline">
-            <a:extLst>
-              <a:ext uri="{FF2B5EF4-FFF2-40B4-BE49-F238E27FC236}">
-                <a16:creationId xmlns:a16="http://schemas.microsoft.com/office/drawing/2014/main" id="{FF41EACC-DDB7-A97C-B78B-EB53F90B4889}"/>
-              </a:ext>
-            </a:extLst>
-          </p:cNvPr>
-          <p:cNvPicPr>
-            <a:picLocks noChangeAspect="1"/>
-          </p:cNvPicPr>
-          <p:nvPr/>
-        </p:nvPicPr>
-        <p:blipFill>
-          <a:blip r:embed="rId6">
-            <a:extLst>
-              <a:ext uri="{96DAC541-7B7A-43D3-8B79-37D633B846F1}">
-                <asvg:svgBlip xmlns:asvg="http://schemas.microsoft.com/office/drawing/2016/SVG/main" r:embed="rId7"/>
-              </a:ext>
-            </a:extLst>
-          </a:blip>
-          <a:stretch>
-            <a:fillRect/>
-          </a:stretch>
-        </p:blipFill>
-        <p:spPr>
-          <a:xfrm>
-            <a:off x="5322640" y="3433520"/>
-            <a:ext cx="214313" cy="214313"/>
-          </a:xfrm>
-          <a:prstGeom prst="rect">
-            <a:avLst/>
-          </a:prstGeom>
-        </p:spPr>
-      </p:pic>
-      <p:pic>
-        <p:nvPicPr>
-          <p:cNvPr id="40" name="Graphic 39" descr="Ant outline">
-            <a:extLst>
-              <a:ext uri="{FF2B5EF4-FFF2-40B4-BE49-F238E27FC236}">
-                <a16:creationId xmlns:a16="http://schemas.microsoft.com/office/drawing/2014/main" id="{54A08F4F-69DD-45FC-0CBB-D863A91B28D9}"/>
-              </a:ext>
-            </a:extLst>
-          </p:cNvPr>
-          <p:cNvPicPr>
-            <a:picLocks noChangeAspect="1"/>
-          </p:cNvPicPr>
-          <p:nvPr/>
-        </p:nvPicPr>
-        <p:blipFill>
-          <a:blip r:embed="rId8">
-            <a:extLst>
-              <a:ext uri="{96DAC541-7B7A-43D3-8B79-37D633B846F1}">
-                <asvg:svgBlip xmlns:asvg="http://schemas.microsoft.com/office/drawing/2016/SVG/main" r:embed="rId9"/>
-              </a:ext>
-            </a:extLst>
-          </a:blip>
-          <a:stretch>
-            <a:fillRect/>
-          </a:stretch>
-        </p:blipFill>
-        <p:spPr>
-          <a:xfrm>
-            <a:off x="5726447" y="3461396"/>
-            <a:ext cx="214313" cy="214313"/>
-          </a:xfrm>
-          <a:prstGeom prst="rect">
-            <a:avLst/>
-          </a:prstGeom>
-        </p:spPr>
-      </p:pic>
-      <p:pic>
-        <p:nvPicPr>
-          <p:cNvPr id="41" name="Graphic 40" descr="Ant outline">
-            <a:extLst>
-              <a:ext uri="{FF2B5EF4-FFF2-40B4-BE49-F238E27FC236}">
-                <a16:creationId xmlns:a16="http://schemas.microsoft.com/office/drawing/2014/main" id="{009B0A45-5030-FA11-BFB9-7B80EAA4ABBB}"/>
-              </a:ext>
-            </a:extLst>
-          </p:cNvPr>
-          <p:cNvPicPr>
-            <a:picLocks noChangeAspect="1"/>
-          </p:cNvPicPr>
-          <p:nvPr/>
-        </p:nvPicPr>
-        <p:blipFill>
-          <a:blip r:embed="rId8">
-            <a:extLst>
-              <a:ext uri="{96DAC541-7B7A-43D3-8B79-37D633B846F1}">
-                <asvg:svgBlip xmlns:asvg="http://schemas.microsoft.com/office/drawing/2016/SVG/main" r:embed="rId9"/>
-              </a:ext>
-            </a:extLst>
-          </a:blip>
-          <a:stretch>
-            <a:fillRect/>
-          </a:stretch>
-        </p:blipFill>
-        <p:spPr>
-          <a:xfrm>
-            <a:off x="5757093" y="3599291"/>
-            <a:ext cx="214313" cy="214313"/>
-          </a:xfrm>
-          <a:prstGeom prst="rect">
-            <a:avLst/>
-          </a:prstGeom>
-        </p:spPr>
-      </p:pic>
-      <p:pic>
-        <p:nvPicPr>
-          <p:cNvPr id="42" name="Graphic 41" descr="Ant outline">
-            <a:extLst>
-              <a:ext uri="{FF2B5EF4-FFF2-40B4-BE49-F238E27FC236}">
-                <a16:creationId xmlns:a16="http://schemas.microsoft.com/office/drawing/2014/main" id="{4CDEBB56-5D5B-6C0B-FF9F-A3F724D9E43F}"/>
-              </a:ext>
-            </a:extLst>
-          </p:cNvPr>
-          <p:cNvPicPr>
-            <a:picLocks noChangeAspect="1"/>
-          </p:cNvPicPr>
-          <p:nvPr/>
-        </p:nvPicPr>
-        <p:blipFill>
-          <a:blip r:embed="rId8">
-            <a:extLst>
-              <a:ext uri="{96DAC541-7B7A-43D3-8B79-37D633B846F1}">
-                <asvg:svgBlip xmlns:asvg="http://schemas.microsoft.com/office/drawing/2016/SVG/main" r:embed="rId9"/>
-              </a:ext>
-            </a:extLst>
-          </a:blip>
-          <a:stretch>
-            <a:fillRect/>
-          </a:stretch>
-        </p:blipFill>
-        <p:spPr>
-          <a:xfrm>
-            <a:off x="5841909" y="3492135"/>
-            <a:ext cx="214313" cy="214313"/>
-          </a:xfrm>
-          <a:prstGeom prst="rect">
-            <a:avLst/>
-          </a:prstGeom>
-        </p:spPr>
-      </p:pic>
-      <p:pic>
-        <p:nvPicPr>
-          <p:cNvPr id="43" name="Graphic 42" descr="Ant outline">
-            <a:extLst>
-              <a:ext uri="{FF2B5EF4-FFF2-40B4-BE49-F238E27FC236}">
-                <a16:creationId xmlns:a16="http://schemas.microsoft.com/office/drawing/2014/main" id="{5BEEC88A-51E2-7758-886B-7D5F6CD6851C}"/>
-              </a:ext>
-            </a:extLst>
-          </p:cNvPr>
-          <p:cNvPicPr>
-            <a:picLocks noChangeAspect="1"/>
-          </p:cNvPicPr>
-          <p:nvPr/>
-        </p:nvPicPr>
-        <p:blipFill>
-          <a:blip r:embed="rId8">
-            <a:extLst>
-              <a:ext uri="{96DAC541-7B7A-43D3-8B79-37D633B846F1}">
-                <asvg:svgBlip xmlns:asvg="http://schemas.microsoft.com/office/drawing/2016/SVG/main" r:embed="rId9"/>
-              </a:ext>
-            </a:extLst>
-          </a:blip>
-          <a:stretch>
-            <a:fillRect/>
-          </a:stretch>
-        </p:blipFill>
-        <p:spPr>
-          <a:xfrm>
-            <a:off x="5892196" y="3633012"/>
-            <a:ext cx="214313" cy="214313"/>
-          </a:xfrm>
-          <a:prstGeom prst="rect">
-            <a:avLst/>
-          </a:prstGeom>
-        </p:spPr>
-      </p:pic>
-      <p:pic>
-        <p:nvPicPr>
-          <p:cNvPr id="44" name="Graphic 43" descr="Ant outline">
-            <a:extLst>
-              <a:ext uri="{FF2B5EF4-FFF2-40B4-BE49-F238E27FC236}">
-                <a16:creationId xmlns:a16="http://schemas.microsoft.com/office/drawing/2014/main" id="{7F50010B-4E6E-862F-98C1-C9D4514CAEE3}"/>
-              </a:ext>
-            </a:extLst>
-          </p:cNvPr>
-          <p:cNvPicPr>
-            <a:picLocks noChangeAspect="1"/>
-          </p:cNvPicPr>
-          <p:nvPr/>
-        </p:nvPicPr>
-        <p:blipFill>
-          <a:blip r:embed="rId8">
-            <a:extLst>
-              <a:ext uri="{96DAC541-7B7A-43D3-8B79-37D633B846F1}">
-                <asvg:svgBlip xmlns:asvg="http://schemas.microsoft.com/office/drawing/2016/SVG/main" r:embed="rId9"/>
-              </a:ext>
-            </a:extLst>
-          </a:blip>
-          <a:stretch>
-            <a:fillRect/>
-          </a:stretch>
-        </p:blipFill>
-        <p:spPr>
-          <a:xfrm>
-            <a:off x="5641786" y="3660767"/>
-            <a:ext cx="214313" cy="214313"/>
-          </a:xfrm>
-          <a:prstGeom prst="rect">
-            <a:avLst/>
-          </a:prstGeom>
-        </p:spPr>
-      </p:pic>
-      <p:pic>
-        <p:nvPicPr>
-          <p:cNvPr id="45" name="Graphic 44" descr="Ant outline">
-            <a:extLst>
-              <a:ext uri="{FF2B5EF4-FFF2-40B4-BE49-F238E27FC236}">
-                <a16:creationId xmlns:a16="http://schemas.microsoft.com/office/drawing/2014/main" id="{77327643-3847-D572-FBF9-7A185B58680A}"/>
-              </a:ext>
-            </a:extLst>
-          </p:cNvPr>
-          <p:cNvPicPr>
-            <a:picLocks noChangeAspect="1"/>
-          </p:cNvPicPr>
-          <p:nvPr/>
-        </p:nvPicPr>
-        <p:blipFill>
-          <a:blip r:embed="rId8">
-            <a:extLst>
-              <a:ext uri="{96DAC541-7B7A-43D3-8B79-37D633B846F1}">
-                <asvg:svgBlip xmlns:asvg="http://schemas.microsoft.com/office/drawing/2016/SVG/main" r:embed="rId9"/>
-              </a:ext>
-            </a:extLst>
-          </a:blip>
-          <a:stretch>
-            <a:fillRect/>
-          </a:stretch>
-        </p:blipFill>
-        <p:spPr>
-          <a:xfrm>
-            <a:off x="5939722" y="3430658"/>
-            <a:ext cx="214313" cy="214313"/>
-          </a:xfrm>
-          <a:prstGeom prst="rect">
-            <a:avLst/>
-          </a:prstGeom>
-        </p:spPr>
-      </p:pic>
-      <p:pic>
-        <p:nvPicPr>
-          <p:cNvPr id="46" name="Graphic 45" descr="Ant outline">
-            <a:extLst>
-              <a:ext uri="{FF2B5EF4-FFF2-40B4-BE49-F238E27FC236}">
-                <a16:creationId xmlns:a16="http://schemas.microsoft.com/office/drawing/2014/main" id="{8F3F8D24-DC09-FD3D-514B-925F05C90A0B}"/>
-              </a:ext>
-            </a:extLst>
-          </p:cNvPr>
-          <p:cNvPicPr>
-            <a:picLocks noChangeAspect="1"/>
-          </p:cNvPicPr>
-          <p:nvPr/>
-        </p:nvPicPr>
-        <p:blipFill>
-          <a:blip r:embed="rId6">
-            <a:extLst>
-              <a:ext uri="{96DAC541-7B7A-43D3-8B79-37D633B846F1}">
-                <asvg:svgBlip xmlns:asvg="http://schemas.microsoft.com/office/drawing/2016/SVG/main" r:embed="rId7"/>
-              </a:ext>
-            </a:extLst>
-          </a:blip>
-          <a:stretch>
-            <a:fillRect/>
-          </a:stretch>
-        </p:blipFill>
-        <p:spPr>
-          <a:xfrm>
-            <a:off x="5125397" y="3965712"/>
-            <a:ext cx="214313" cy="214313"/>
-          </a:xfrm>
-          <a:prstGeom prst="rect">
-            <a:avLst/>
-          </a:prstGeom>
-        </p:spPr>
-      </p:pic>
-      <p:pic>
-        <p:nvPicPr>
-          <p:cNvPr id="47" name="Graphic 46" descr="Ant outline">
-            <a:extLst>
-              <a:ext uri="{FF2B5EF4-FFF2-40B4-BE49-F238E27FC236}">
-                <a16:creationId xmlns:a16="http://schemas.microsoft.com/office/drawing/2014/main" id="{87D9DF6D-F6D5-34BE-6900-69DE5CCF0B44}"/>
-              </a:ext>
-            </a:extLst>
-          </p:cNvPr>
-          <p:cNvPicPr>
-            <a:picLocks noChangeAspect="1"/>
-          </p:cNvPicPr>
-          <p:nvPr/>
-        </p:nvPicPr>
-        <p:blipFill>
-          <a:blip r:embed="rId6">
-            <a:extLst>
-              <a:ext uri="{96DAC541-7B7A-43D3-8B79-37D633B846F1}">
-                <asvg:svgBlip xmlns:asvg="http://schemas.microsoft.com/office/drawing/2016/SVG/main" r:embed="rId7"/>
-              </a:ext>
-            </a:extLst>
-          </a:blip>
-          <a:stretch>
-            <a:fillRect/>
-          </a:stretch>
-        </p:blipFill>
-        <p:spPr>
-          <a:xfrm>
-            <a:off x="5156043" y="4103607"/>
-            <a:ext cx="214313" cy="214313"/>
-          </a:xfrm>
-          <a:prstGeom prst="rect">
-            <a:avLst/>
-          </a:prstGeom>
-        </p:spPr>
-      </p:pic>
-      <p:pic>
-        <p:nvPicPr>
-          <p:cNvPr id="48" name="Graphic 47" descr="Ant outline">
-            <a:extLst>
-              <a:ext uri="{FF2B5EF4-FFF2-40B4-BE49-F238E27FC236}">
-                <a16:creationId xmlns:a16="http://schemas.microsoft.com/office/drawing/2014/main" id="{2F20A3F7-0E80-147F-B252-7524EE1236A6}"/>
-              </a:ext>
-            </a:extLst>
-          </p:cNvPr>
-          <p:cNvPicPr>
-            <a:picLocks noChangeAspect="1"/>
-          </p:cNvPicPr>
-          <p:nvPr/>
-        </p:nvPicPr>
-        <p:blipFill>
-          <a:blip r:embed="rId6">
-            <a:extLst>
-              <a:ext uri="{96DAC541-7B7A-43D3-8B79-37D633B846F1}">
-                <asvg:svgBlip xmlns:asvg="http://schemas.microsoft.com/office/drawing/2016/SVG/main" r:embed="rId7"/>
-              </a:ext>
-            </a:extLst>
-          </a:blip>
-          <a:stretch>
-            <a:fillRect/>
-          </a:stretch>
-        </p:blipFill>
-        <p:spPr>
-          <a:xfrm>
-            <a:off x="5240859" y="3996451"/>
-            <a:ext cx="214313" cy="214313"/>
-          </a:xfrm>
-          <a:prstGeom prst="rect">
-            <a:avLst/>
-          </a:prstGeom>
-        </p:spPr>
-      </p:pic>
-      <p:pic>
-        <p:nvPicPr>
-          <p:cNvPr id="49" name="Graphic 48" descr="Ant outline">
-            <a:extLst>
-              <a:ext uri="{FF2B5EF4-FFF2-40B4-BE49-F238E27FC236}">
-                <a16:creationId xmlns:a16="http://schemas.microsoft.com/office/drawing/2014/main" id="{B95C65AF-1F6B-14EF-32DD-6DBA1854D339}"/>
-              </a:ext>
-            </a:extLst>
-          </p:cNvPr>
-          <p:cNvPicPr>
-            <a:picLocks noChangeAspect="1"/>
-          </p:cNvPicPr>
-          <p:nvPr/>
-        </p:nvPicPr>
-        <p:blipFill>
-          <a:blip r:embed="rId6">
-            <a:extLst>
-              <a:ext uri="{96DAC541-7B7A-43D3-8B79-37D633B846F1}">
-                <asvg:svgBlip xmlns:asvg="http://schemas.microsoft.com/office/drawing/2016/SVG/main" r:embed="rId7"/>
-              </a:ext>
-            </a:extLst>
-          </a:blip>
-          <a:stretch>
-            <a:fillRect/>
-          </a:stretch>
-        </p:blipFill>
-        <p:spPr>
-          <a:xfrm>
-            <a:off x="5291146" y="4137328"/>
-            <a:ext cx="214313" cy="214313"/>
-          </a:xfrm>
-          <a:prstGeom prst="rect">
-            <a:avLst/>
-          </a:prstGeom>
-        </p:spPr>
-      </p:pic>
-      <p:pic>
-        <p:nvPicPr>
-          <p:cNvPr id="50" name="Graphic 49" descr="Ant outline">
-            <a:extLst>
-              <a:ext uri="{FF2B5EF4-FFF2-40B4-BE49-F238E27FC236}">
-                <a16:creationId xmlns:a16="http://schemas.microsoft.com/office/drawing/2014/main" id="{6DDE4946-DBAD-1D52-6585-77DB01B8724C}"/>
-              </a:ext>
-            </a:extLst>
-          </p:cNvPr>
-          <p:cNvPicPr>
-            <a:picLocks noChangeAspect="1"/>
-          </p:cNvPicPr>
-          <p:nvPr/>
-        </p:nvPicPr>
-        <p:blipFill>
-          <a:blip r:embed="rId6">
-            <a:extLst>
-              <a:ext uri="{96DAC541-7B7A-43D3-8B79-37D633B846F1}">
-                <asvg:svgBlip xmlns:asvg="http://schemas.microsoft.com/office/drawing/2016/SVG/main" r:embed="rId7"/>
-              </a:ext>
-            </a:extLst>
-          </a:blip>
-          <a:stretch>
-            <a:fillRect/>
-          </a:stretch>
-        </p:blipFill>
-        <p:spPr>
-          <a:xfrm>
-            <a:off x="5040736" y="4165083"/>
-            <a:ext cx="214313" cy="214313"/>
-          </a:xfrm>
-          <a:prstGeom prst="rect">
-            <a:avLst/>
-          </a:prstGeom>
-        </p:spPr>
-      </p:pic>
-      <p:pic>
-        <p:nvPicPr>
-          <p:cNvPr id="51" name="Graphic 50" descr="Ant outline">
-            <a:extLst>
-              <a:ext uri="{FF2B5EF4-FFF2-40B4-BE49-F238E27FC236}">
-                <a16:creationId xmlns:a16="http://schemas.microsoft.com/office/drawing/2014/main" id="{5C779AF4-4759-FDE0-DBA5-693A38B07E75}"/>
-              </a:ext>
-            </a:extLst>
-          </p:cNvPr>
-          <p:cNvPicPr>
-            <a:picLocks noChangeAspect="1"/>
-          </p:cNvPicPr>
-          <p:nvPr/>
-        </p:nvPicPr>
-        <p:blipFill>
-          <a:blip r:embed="rId6">
-            <a:extLst>
-              <a:ext uri="{96DAC541-7B7A-43D3-8B79-37D633B846F1}">
-                <asvg:svgBlip xmlns:asvg="http://schemas.microsoft.com/office/drawing/2016/SVG/main" r:embed="rId7"/>
-              </a:ext>
-            </a:extLst>
-          </a:blip>
-          <a:stretch>
-            <a:fillRect/>
-          </a:stretch>
-        </p:blipFill>
-        <p:spPr>
-          <a:xfrm>
-            <a:off x="5338672" y="3934974"/>
-            <a:ext cx="214313" cy="214313"/>
-          </a:xfrm>
-          <a:prstGeom prst="rect">
-            <a:avLst/>
-          </a:prstGeom>
-        </p:spPr>
-      </p:pic>
-      <p:pic>
-        <p:nvPicPr>
-          <p:cNvPr id="52" name="Graphic 51" descr="Ant outline">
-            <a:extLst>
-              <a:ext uri="{FF2B5EF4-FFF2-40B4-BE49-F238E27FC236}">
-                <a16:creationId xmlns:a16="http://schemas.microsoft.com/office/drawing/2014/main" id="{8DD22248-5005-B7B2-2F6D-B14687589A34}"/>
-              </a:ext>
-            </a:extLst>
-          </p:cNvPr>
-          <p:cNvPicPr>
-            <a:picLocks noChangeAspect="1"/>
-          </p:cNvPicPr>
-          <p:nvPr/>
-        </p:nvPicPr>
-        <p:blipFill>
-          <a:blip r:embed="rId4">
-            <a:extLst>
-              <a:ext uri="{96DAC541-7B7A-43D3-8B79-37D633B846F1}">
-                <asvg:svgBlip xmlns:asvg="http://schemas.microsoft.com/office/drawing/2016/SVG/main" r:embed="rId5"/>
-              </a:ext>
-            </a:extLst>
-          </a:blip>
-          <a:stretch>
-            <a:fillRect/>
-          </a:stretch>
-        </p:blipFill>
-        <p:spPr>
-          <a:xfrm>
-            <a:off x="5737201" y="3968255"/>
-            <a:ext cx="214313" cy="214313"/>
-          </a:xfrm>
-          <a:prstGeom prst="rect">
-            <a:avLst/>
-          </a:prstGeom>
-        </p:spPr>
-      </p:pic>
-      <p:pic>
-        <p:nvPicPr>
-          <p:cNvPr id="53" name="Graphic 52" descr="Ant outline">
-            <a:extLst>
-              <a:ext uri="{FF2B5EF4-FFF2-40B4-BE49-F238E27FC236}">
-                <a16:creationId xmlns:a16="http://schemas.microsoft.com/office/drawing/2014/main" id="{8F778C3C-8EF2-596C-51D7-B850D2864D15}"/>
-              </a:ext>
-            </a:extLst>
-          </p:cNvPr>
-          <p:cNvPicPr>
-            <a:picLocks noChangeAspect="1"/>
-          </p:cNvPicPr>
-          <p:nvPr/>
-        </p:nvPicPr>
-        <p:blipFill>
-          <a:blip r:embed="rId4">
-            <a:extLst>
-              <a:ext uri="{96DAC541-7B7A-43D3-8B79-37D633B846F1}">
-                <asvg:svgBlip xmlns:asvg="http://schemas.microsoft.com/office/drawing/2016/SVG/main" r:embed="rId5"/>
-              </a:ext>
-            </a:extLst>
-          </a:blip>
-          <a:stretch>
-            <a:fillRect/>
-          </a:stretch>
-        </p:blipFill>
-        <p:spPr>
-          <a:xfrm>
-            <a:off x="5767847" y="4106150"/>
-            <a:ext cx="214313" cy="214313"/>
-          </a:xfrm>
-          <a:prstGeom prst="rect">
-            <a:avLst/>
-          </a:prstGeom>
-        </p:spPr>
-      </p:pic>
-      <p:pic>
-        <p:nvPicPr>
-          <p:cNvPr id="54" name="Graphic 53" descr="Ant outline">
-            <a:extLst>
-              <a:ext uri="{FF2B5EF4-FFF2-40B4-BE49-F238E27FC236}">
-                <a16:creationId xmlns:a16="http://schemas.microsoft.com/office/drawing/2014/main" id="{5BDFD76F-52B8-2391-2E61-A34012D731EA}"/>
-              </a:ext>
-            </a:extLst>
-          </p:cNvPr>
-          <p:cNvPicPr>
-            <a:picLocks noChangeAspect="1"/>
-          </p:cNvPicPr>
-          <p:nvPr/>
-        </p:nvPicPr>
-        <p:blipFill>
-          <a:blip r:embed="rId4">
-            <a:extLst>
-              <a:ext uri="{96DAC541-7B7A-43D3-8B79-37D633B846F1}">
-                <asvg:svgBlip xmlns:asvg="http://schemas.microsoft.com/office/drawing/2016/SVG/main" r:embed="rId5"/>
-              </a:ext>
-            </a:extLst>
-          </a:blip>
-          <a:stretch>
-            <a:fillRect/>
-          </a:stretch>
-        </p:blipFill>
-        <p:spPr>
-          <a:xfrm>
-            <a:off x="5852663" y="3998994"/>
-            <a:ext cx="214313" cy="214313"/>
-          </a:xfrm>
-          <a:prstGeom prst="rect">
-            <a:avLst/>
-          </a:prstGeom>
-        </p:spPr>
-      </p:pic>
-      <p:pic>
-        <p:nvPicPr>
-          <p:cNvPr id="55" name="Graphic 54" descr="Ant outline">
-            <a:extLst>
-              <a:ext uri="{FF2B5EF4-FFF2-40B4-BE49-F238E27FC236}">
-                <a16:creationId xmlns:a16="http://schemas.microsoft.com/office/drawing/2014/main" id="{9A93EF3A-1CDE-ADB0-3FCA-538C387CCB89}"/>
-              </a:ext>
-            </a:extLst>
-          </p:cNvPr>
-          <p:cNvPicPr>
-            <a:picLocks noChangeAspect="1"/>
-          </p:cNvPicPr>
-          <p:nvPr/>
-        </p:nvPicPr>
-        <p:blipFill>
-          <a:blip r:embed="rId4">
-            <a:extLst>
-              <a:ext uri="{96DAC541-7B7A-43D3-8B79-37D633B846F1}">
-                <asvg:svgBlip xmlns:asvg="http://schemas.microsoft.com/office/drawing/2016/SVG/main" r:embed="rId5"/>
-              </a:ext>
-            </a:extLst>
-          </a:blip>
-          <a:stretch>
-            <a:fillRect/>
-          </a:stretch>
-        </p:blipFill>
-        <p:spPr>
-          <a:xfrm>
-            <a:off x="5902950" y="4139871"/>
-            <a:ext cx="214313" cy="214313"/>
-          </a:xfrm>
-          <a:prstGeom prst="rect">
-            <a:avLst/>
-          </a:prstGeom>
-        </p:spPr>
-      </p:pic>
-      <p:pic>
-        <p:nvPicPr>
-          <p:cNvPr id="56" name="Graphic 55" descr="Ant outline">
-            <a:extLst>
-              <a:ext uri="{FF2B5EF4-FFF2-40B4-BE49-F238E27FC236}">
-                <a16:creationId xmlns:a16="http://schemas.microsoft.com/office/drawing/2014/main" id="{ACD3A1CC-B13E-1402-F513-E28C980CD432}"/>
-              </a:ext>
-            </a:extLst>
-          </p:cNvPr>
-          <p:cNvPicPr>
-            <a:picLocks noChangeAspect="1"/>
-          </p:cNvPicPr>
-          <p:nvPr/>
-        </p:nvPicPr>
-        <p:blipFill>
-          <a:blip r:embed="rId4">
-            <a:extLst>
-              <a:ext uri="{96DAC541-7B7A-43D3-8B79-37D633B846F1}">
-                <asvg:svgBlip xmlns:asvg="http://schemas.microsoft.com/office/drawing/2016/SVG/main" r:embed="rId5"/>
-              </a:ext>
-            </a:extLst>
-          </a:blip>
-          <a:stretch>
-            <a:fillRect/>
-          </a:stretch>
-        </p:blipFill>
-        <p:spPr>
-          <a:xfrm>
-            <a:off x="5652540" y="4167626"/>
-            <a:ext cx="214313" cy="214313"/>
-          </a:xfrm>
-          <a:prstGeom prst="rect">
-            <a:avLst/>
-          </a:prstGeom>
-        </p:spPr>
-      </p:pic>
-      <p:pic>
-        <p:nvPicPr>
-          <p:cNvPr id="57" name="Graphic 56" descr="Ant outline">
-            <a:extLst>
-              <a:ext uri="{FF2B5EF4-FFF2-40B4-BE49-F238E27FC236}">
-                <a16:creationId xmlns:a16="http://schemas.microsoft.com/office/drawing/2014/main" id="{03897921-779E-284D-C5BB-BD31E5FE47DC}"/>
-              </a:ext>
-            </a:extLst>
-          </p:cNvPr>
-          <p:cNvPicPr>
-            <a:picLocks noChangeAspect="1"/>
-          </p:cNvPicPr>
-          <p:nvPr/>
-        </p:nvPicPr>
-        <p:blipFill>
-          <a:blip r:embed="rId4">
-            <a:extLst>
-              <a:ext uri="{96DAC541-7B7A-43D3-8B79-37D633B846F1}">
-                <asvg:svgBlip xmlns:asvg="http://schemas.microsoft.com/office/drawing/2016/SVG/main" r:embed="rId5"/>
-              </a:ext>
-            </a:extLst>
-          </a:blip>
-          <a:stretch>
-            <a:fillRect/>
-          </a:stretch>
-        </p:blipFill>
-        <p:spPr>
-          <a:xfrm>
-            <a:off x="5950476" y="3937517"/>
-            <a:ext cx="214313" cy="214313"/>
-          </a:xfrm>
-          <a:prstGeom prst="rect">
-            <a:avLst/>
-          </a:prstGeom>
-        </p:spPr>
-      </p:pic>
-      <p:pic>
-        <p:nvPicPr>
-          <p:cNvPr id="58" name="Graphic 57" descr="Ant outline">
-            <a:extLst>
-              <a:ext uri="{FF2B5EF4-FFF2-40B4-BE49-F238E27FC236}">
-                <a16:creationId xmlns:a16="http://schemas.microsoft.com/office/drawing/2014/main" id="{43E33082-330A-EDAC-A1AE-BBB2093555C3}"/>
-              </a:ext>
-            </a:extLst>
-          </p:cNvPr>
-          <p:cNvPicPr>
-            <a:picLocks noChangeAspect="1"/>
-          </p:cNvPicPr>
-          <p:nvPr/>
-        </p:nvPicPr>
-        <p:blipFill>
-          <a:blip r:embed="rId8">
-            <a:extLst>
-              <a:ext uri="{96DAC541-7B7A-43D3-8B79-37D633B846F1}">
-                <asvg:svgBlip xmlns:asvg="http://schemas.microsoft.com/office/drawing/2016/SVG/main" r:embed="rId9"/>
-              </a:ext>
-            </a:extLst>
-          </a:blip>
-          <a:stretch>
-            <a:fillRect/>
-          </a:stretch>
-        </p:blipFill>
-        <p:spPr>
-          <a:xfrm>
-            <a:off x="5117515" y="4511214"/>
-            <a:ext cx="214313" cy="214313"/>
-          </a:xfrm>
-          <a:prstGeom prst="rect">
-            <a:avLst/>
-          </a:prstGeom>
-        </p:spPr>
-      </p:pic>
-      <p:pic>
-        <p:nvPicPr>
-          <p:cNvPr id="59" name="Graphic 58" descr="Ant outline">
-            <a:extLst>
-              <a:ext uri="{FF2B5EF4-FFF2-40B4-BE49-F238E27FC236}">
-                <a16:creationId xmlns:a16="http://schemas.microsoft.com/office/drawing/2014/main" id="{25BB0D52-2565-DBA2-3095-CCEE6672D66D}"/>
-              </a:ext>
-            </a:extLst>
-          </p:cNvPr>
-          <p:cNvPicPr>
-            <a:picLocks noChangeAspect="1"/>
-          </p:cNvPicPr>
-          <p:nvPr/>
-        </p:nvPicPr>
-        <p:blipFill>
-          <a:blip r:embed="rId8">
-            <a:extLst>
-              <a:ext uri="{96DAC541-7B7A-43D3-8B79-37D633B846F1}">
-                <asvg:svgBlip xmlns:asvg="http://schemas.microsoft.com/office/drawing/2016/SVG/main" r:embed="rId9"/>
-              </a:ext>
-            </a:extLst>
-          </a:blip>
-          <a:stretch>
-            <a:fillRect/>
-          </a:stretch>
-        </p:blipFill>
-        <p:spPr>
-          <a:xfrm>
-            <a:off x="5148161" y="4649109"/>
-            <a:ext cx="214313" cy="214313"/>
-          </a:xfrm>
-          <a:prstGeom prst="rect">
-            <a:avLst/>
-          </a:prstGeom>
-        </p:spPr>
-      </p:pic>
-      <p:pic>
-        <p:nvPicPr>
-          <p:cNvPr id="60" name="Graphic 59" descr="Ant outline">
-            <a:extLst>
-              <a:ext uri="{FF2B5EF4-FFF2-40B4-BE49-F238E27FC236}">
-                <a16:creationId xmlns:a16="http://schemas.microsoft.com/office/drawing/2014/main" id="{F18D82DF-3EC5-2D4B-66B4-29727F437234}"/>
-              </a:ext>
-            </a:extLst>
-          </p:cNvPr>
-          <p:cNvPicPr>
-            <a:picLocks noChangeAspect="1"/>
-          </p:cNvPicPr>
-          <p:nvPr/>
-        </p:nvPicPr>
-        <p:blipFill>
-          <a:blip r:embed="rId8">
-            <a:extLst>
-              <a:ext uri="{96DAC541-7B7A-43D3-8B79-37D633B846F1}">
-                <asvg:svgBlip xmlns:asvg="http://schemas.microsoft.com/office/drawing/2016/SVG/main" r:embed="rId9"/>
-              </a:ext>
-            </a:extLst>
-          </a:blip>
-          <a:stretch>
-            <a:fillRect/>
-          </a:stretch>
-        </p:blipFill>
-        <p:spPr>
-          <a:xfrm>
-            <a:off x="5232977" y="4541953"/>
-            <a:ext cx="214313" cy="214313"/>
-          </a:xfrm>
-          <a:prstGeom prst="rect">
-            <a:avLst/>
-          </a:prstGeom>
-        </p:spPr>
-      </p:pic>
-      <p:pic>
-        <p:nvPicPr>
-          <p:cNvPr id="61" name="Graphic 60" descr="Ant outline">
-            <a:extLst>
-              <a:ext uri="{FF2B5EF4-FFF2-40B4-BE49-F238E27FC236}">
-                <a16:creationId xmlns:a16="http://schemas.microsoft.com/office/drawing/2014/main" id="{4EF418B6-4F49-C6A0-A293-47D42176EEB1}"/>
-              </a:ext>
-            </a:extLst>
-          </p:cNvPr>
-          <p:cNvPicPr>
-            <a:picLocks noChangeAspect="1"/>
-          </p:cNvPicPr>
-          <p:nvPr/>
-        </p:nvPicPr>
-        <p:blipFill>
-          <a:blip r:embed="rId8">
-            <a:extLst>
-              <a:ext uri="{96DAC541-7B7A-43D3-8B79-37D633B846F1}">
-                <asvg:svgBlip xmlns:asvg="http://schemas.microsoft.com/office/drawing/2016/SVG/main" r:embed="rId9"/>
-              </a:ext>
-            </a:extLst>
-          </a:blip>
-          <a:stretch>
-            <a:fillRect/>
-          </a:stretch>
-        </p:blipFill>
-        <p:spPr>
-          <a:xfrm>
-            <a:off x="5283264" y="4682830"/>
-            <a:ext cx="214313" cy="214313"/>
-          </a:xfrm>
-          <a:prstGeom prst="rect">
-            <a:avLst/>
-          </a:prstGeom>
-        </p:spPr>
-      </p:pic>
-      <p:pic>
-        <p:nvPicPr>
-          <p:cNvPr id="62" name="Graphic 61" descr="Ant outline">
-            <a:extLst>
-              <a:ext uri="{FF2B5EF4-FFF2-40B4-BE49-F238E27FC236}">
-                <a16:creationId xmlns:a16="http://schemas.microsoft.com/office/drawing/2014/main" id="{9523F814-B402-4846-0C09-AED4518DE259}"/>
-              </a:ext>
-            </a:extLst>
-          </p:cNvPr>
-          <p:cNvPicPr>
-            <a:picLocks noChangeAspect="1"/>
-          </p:cNvPicPr>
-          <p:nvPr/>
-        </p:nvPicPr>
-        <p:blipFill>
-          <a:blip r:embed="rId8">
-            <a:extLst>
-              <a:ext uri="{96DAC541-7B7A-43D3-8B79-37D633B846F1}">
-                <asvg:svgBlip xmlns:asvg="http://schemas.microsoft.com/office/drawing/2016/SVG/main" r:embed="rId9"/>
-              </a:ext>
-            </a:extLst>
-          </a:blip>
-          <a:stretch>
-            <a:fillRect/>
-          </a:stretch>
-        </p:blipFill>
-        <p:spPr>
-          <a:xfrm>
-            <a:off x="5032854" y="4710585"/>
-            <a:ext cx="214313" cy="214313"/>
-          </a:xfrm>
-          <a:prstGeom prst="rect">
-            <a:avLst/>
-          </a:prstGeom>
-        </p:spPr>
-      </p:pic>
-      <p:pic>
-        <p:nvPicPr>
-          <p:cNvPr id="63" name="Graphic 62" descr="Ant outline">
-            <a:extLst>
-              <a:ext uri="{FF2B5EF4-FFF2-40B4-BE49-F238E27FC236}">
-                <a16:creationId xmlns:a16="http://schemas.microsoft.com/office/drawing/2014/main" id="{86416A91-5133-DB14-6515-3BA8BDCA413D}"/>
-              </a:ext>
-            </a:extLst>
-          </p:cNvPr>
-          <p:cNvPicPr>
-            <a:picLocks noChangeAspect="1"/>
-          </p:cNvPicPr>
-          <p:nvPr/>
-        </p:nvPicPr>
-        <p:blipFill>
-          <a:blip r:embed="rId8">
-            <a:extLst>
-              <a:ext uri="{96DAC541-7B7A-43D3-8B79-37D633B846F1}">
-                <asvg:svgBlip xmlns:asvg="http://schemas.microsoft.com/office/drawing/2016/SVG/main" r:embed="rId9"/>
-              </a:ext>
-            </a:extLst>
-          </a:blip>
-          <a:stretch>
-            <a:fillRect/>
-          </a:stretch>
-        </p:blipFill>
-        <p:spPr>
-          <a:xfrm>
-            <a:off x="5330790" y="4480476"/>
-            <a:ext cx="214313" cy="214313"/>
-          </a:xfrm>
-          <a:prstGeom prst="rect">
-            <a:avLst/>
-          </a:prstGeom>
-        </p:spPr>
-      </p:pic>
-      <p:pic>
-        <p:nvPicPr>
-          <p:cNvPr id="64" name="Graphic 63" descr="Ant outline">
-            <a:extLst>
-              <a:ext uri="{FF2B5EF4-FFF2-40B4-BE49-F238E27FC236}">
-                <a16:creationId xmlns:a16="http://schemas.microsoft.com/office/drawing/2014/main" id="{E795E448-44CB-B32D-6875-BB64C174A931}"/>
-              </a:ext>
-            </a:extLst>
-          </p:cNvPr>
-          <p:cNvPicPr>
-            <a:picLocks noChangeAspect="1"/>
-          </p:cNvPicPr>
-          <p:nvPr/>
-        </p:nvPicPr>
-        <p:blipFill>
-          <a:blip r:embed="rId2">
-            <a:extLst>
-              <a:ext uri="{96DAC541-7B7A-43D3-8B79-37D633B846F1}">
-                <asvg:svgBlip xmlns:asvg="http://schemas.microsoft.com/office/drawing/2016/SVG/main" r:embed="rId3"/>
-              </a:ext>
-            </a:extLst>
-          </a:blip>
-          <a:stretch>
-            <a:fillRect/>
-          </a:stretch>
-        </p:blipFill>
-        <p:spPr>
-          <a:xfrm>
-            <a:off x="5726447" y="4511011"/>
-            <a:ext cx="214313" cy="214313"/>
-          </a:xfrm>
-          <a:prstGeom prst="rect">
-            <a:avLst/>
-          </a:prstGeom>
-        </p:spPr>
-      </p:pic>
-      <p:pic>
-        <p:nvPicPr>
-          <p:cNvPr id="65" name="Graphic 64" descr="Ant outline">
-            <a:extLst>
-              <a:ext uri="{FF2B5EF4-FFF2-40B4-BE49-F238E27FC236}">
-                <a16:creationId xmlns:a16="http://schemas.microsoft.com/office/drawing/2014/main" id="{EA289E88-58DE-7139-C86E-0349BC6E0D22}"/>
-              </a:ext>
-            </a:extLst>
-          </p:cNvPr>
-          <p:cNvPicPr>
-            <a:picLocks noChangeAspect="1"/>
-          </p:cNvPicPr>
-          <p:nvPr/>
-        </p:nvPicPr>
-        <p:blipFill>
-          <a:blip r:embed="rId2">
-            <a:extLst>
-              <a:ext uri="{96DAC541-7B7A-43D3-8B79-37D633B846F1}">
-                <asvg:svgBlip xmlns:asvg="http://schemas.microsoft.com/office/drawing/2016/SVG/main" r:embed="rId3"/>
-              </a:ext>
-            </a:extLst>
-          </a:blip>
-          <a:stretch>
-            <a:fillRect/>
-          </a:stretch>
-        </p:blipFill>
-        <p:spPr>
-          <a:xfrm>
-            <a:off x="5757093" y="4648906"/>
-            <a:ext cx="214313" cy="214313"/>
-          </a:xfrm>
-          <a:prstGeom prst="rect">
-            <a:avLst/>
-          </a:prstGeom>
-        </p:spPr>
-      </p:pic>
-      <p:pic>
-        <p:nvPicPr>
-          <p:cNvPr id="66" name="Graphic 65" descr="Ant outline">
-            <a:extLst>
-              <a:ext uri="{FF2B5EF4-FFF2-40B4-BE49-F238E27FC236}">
-                <a16:creationId xmlns:a16="http://schemas.microsoft.com/office/drawing/2014/main" id="{F8E95CE3-2381-C572-BC84-B9CA4686E997}"/>
-              </a:ext>
-            </a:extLst>
-          </p:cNvPr>
-          <p:cNvPicPr>
-            <a:picLocks noChangeAspect="1"/>
-          </p:cNvPicPr>
-          <p:nvPr/>
-        </p:nvPicPr>
-        <p:blipFill>
-          <a:blip r:embed="rId2">
-            <a:extLst>
-              <a:ext uri="{96DAC541-7B7A-43D3-8B79-37D633B846F1}">
-                <asvg:svgBlip xmlns:asvg="http://schemas.microsoft.com/office/drawing/2016/SVG/main" r:embed="rId3"/>
-              </a:ext>
-            </a:extLst>
-          </a:blip>
-          <a:stretch>
-            <a:fillRect/>
-          </a:stretch>
-        </p:blipFill>
-        <p:spPr>
-          <a:xfrm>
-            <a:off x="5841909" y="4541750"/>
-            <a:ext cx="214313" cy="214313"/>
-          </a:xfrm>
-          <a:prstGeom prst="rect">
-            <a:avLst/>
-          </a:prstGeom>
-        </p:spPr>
-      </p:pic>
-      <p:pic>
-        <p:nvPicPr>
-          <p:cNvPr id="67" name="Graphic 66" descr="Ant outline">
-            <a:extLst>
-              <a:ext uri="{FF2B5EF4-FFF2-40B4-BE49-F238E27FC236}">
-                <a16:creationId xmlns:a16="http://schemas.microsoft.com/office/drawing/2014/main" id="{7FD2EE24-AD25-05E5-F866-3964CBCEF02B}"/>
-              </a:ext>
-            </a:extLst>
-          </p:cNvPr>
-          <p:cNvPicPr>
-            <a:picLocks noChangeAspect="1"/>
-          </p:cNvPicPr>
-          <p:nvPr/>
-        </p:nvPicPr>
-        <p:blipFill>
-          <a:blip r:embed="rId2">
-            <a:extLst>
-              <a:ext uri="{96DAC541-7B7A-43D3-8B79-37D633B846F1}">
-                <asvg:svgBlip xmlns:asvg="http://schemas.microsoft.com/office/drawing/2016/SVG/main" r:embed="rId3"/>
-              </a:ext>
-            </a:extLst>
-          </a:blip>
-          <a:stretch>
-            <a:fillRect/>
-          </a:stretch>
-        </p:blipFill>
-        <p:spPr>
-          <a:xfrm>
-            <a:off x="5892196" y="4682627"/>
-            <a:ext cx="214313" cy="214313"/>
-          </a:xfrm>
-          <a:prstGeom prst="rect">
-            <a:avLst/>
-          </a:prstGeom>
-        </p:spPr>
-      </p:pic>
-      <p:pic>
-        <p:nvPicPr>
-          <p:cNvPr id="68" name="Graphic 67" descr="Ant outline">
-            <a:extLst>
-              <a:ext uri="{FF2B5EF4-FFF2-40B4-BE49-F238E27FC236}">
-                <a16:creationId xmlns:a16="http://schemas.microsoft.com/office/drawing/2014/main" id="{FE1302D3-132A-93D7-DDFB-5F85583B375A}"/>
-              </a:ext>
-            </a:extLst>
-          </p:cNvPr>
-          <p:cNvPicPr>
-            <a:picLocks noChangeAspect="1"/>
-          </p:cNvPicPr>
-          <p:nvPr/>
-        </p:nvPicPr>
-        <p:blipFill>
-          <a:blip r:embed="rId2">
-            <a:extLst>
-              <a:ext uri="{96DAC541-7B7A-43D3-8B79-37D633B846F1}">
-                <asvg:svgBlip xmlns:asvg="http://schemas.microsoft.com/office/drawing/2016/SVG/main" r:embed="rId3"/>
-              </a:ext>
-            </a:extLst>
-          </a:blip>
-          <a:stretch>
-            <a:fillRect/>
-          </a:stretch>
-        </p:blipFill>
-        <p:spPr>
-          <a:xfrm>
-            <a:off x="5641786" y="4710382"/>
-            <a:ext cx="214313" cy="214313"/>
-          </a:xfrm>
-          <a:prstGeom prst="rect">
-            <a:avLst/>
-          </a:prstGeom>
-        </p:spPr>
-      </p:pic>
-      <p:pic>
-        <p:nvPicPr>
-          <p:cNvPr id="69" name="Graphic 68" descr="Ant outline">
-            <a:extLst>
-              <a:ext uri="{FF2B5EF4-FFF2-40B4-BE49-F238E27FC236}">
-                <a16:creationId xmlns:a16="http://schemas.microsoft.com/office/drawing/2014/main" id="{5C494414-3942-A71D-C432-552831A59B7B}"/>
-              </a:ext>
-            </a:extLst>
-          </p:cNvPr>
-          <p:cNvPicPr>
-            <a:picLocks noChangeAspect="1"/>
-          </p:cNvPicPr>
-          <p:nvPr/>
-        </p:nvPicPr>
-        <p:blipFill>
-          <a:blip r:embed="rId2">
-            <a:extLst>
-              <a:ext uri="{96DAC541-7B7A-43D3-8B79-37D633B846F1}">
-                <asvg:svgBlip xmlns:asvg="http://schemas.microsoft.com/office/drawing/2016/SVG/main" r:embed="rId3"/>
-              </a:ext>
-            </a:extLst>
-          </a:blip>
-          <a:stretch>
-            <a:fillRect/>
-          </a:stretch>
-        </p:blipFill>
-        <p:spPr>
-          <a:xfrm>
-            <a:off x="5939722" y="4480273"/>
-            <a:ext cx="214313" cy="214313"/>
-          </a:xfrm>
-          <a:prstGeom prst="rect">
-            <a:avLst/>
-          </a:prstGeom>
-        </p:spPr>
-      </p:pic>
-      <p:pic>
-        <p:nvPicPr>
-          <p:cNvPr id="72" name="Graphic 71" descr="Ant outline">
-            <a:extLst>
-              <a:ext uri="{FF2B5EF4-FFF2-40B4-BE49-F238E27FC236}">
-                <a16:creationId xmlns:a16="http://schemas.microsoft.com/office/drawing/2014/main" id="{4E432E13-AA6C-935E-AE2A-50BB22490686}"/>
-              </a:ext>
-            </a:extLst>
-          </p:cNvPr>
-          <p:cNvPicPr>
-            <a:picLocks noChangeAspect="1"/>
-          </p:cNvPicPr>
-          <p:nvPr/>
-        </p:nvPicPr>
-        <p:blipFill>
-          <a:blip r:embed="rId2">
-            <a:extLst>
-              <a:ext uri="{96DAC541-7B7A-43D3-8B79-37D633B846F1}">
-                <asvg:svgBlip xmlns:asvg="http://schemas.microsoft.com/office/drawing/2016/SVG/main" r:embed="rId3"/>
-              </a:ext>
-            </a:extLst>
-          </a:blip>
-          <a:stretch>
-            <a:fillRect/>
-          </a:stretch>
-        </p:blipFill>
-        <p:spPr>
-          <a:xfrm>
-            <a:off x="5264432" y="3109093"/>
-            <a:ext cx="214313" cy="214313"/>
-          </a:xfrm>
-          <a:prstGeom prst="rect">
-            <a:avLst/>
-          </a:prstGeom>
-        </p:spPr>
-      </p:pic>
       <p:sp>
         <p:nvSpPr>
           <p:cNvPr id="81" name="Freeform: Shape 80">
@@ -5981,8 +3953,8 @@
         </p:nvSpPr>
         <p:spPr>
           <a:xfrm rot="18843918">
-            <a:off x="183943" y="4199095"/>
-            <a:ext cx="1035941" cy="1100588"/>
+            <a:off x="98313" y="4458714"/>
+            <a:ext cx="1690575" cy="1710098"/>
           </a:xfrm>
           <a:prstGeom prst="teardrop">
             <a:avLst>
@@ -6034,10 +4006,10 @@
       </p:sp>
       <p:pic>
         <p:nvPicPr>
-          <p:cNvPr id="83" name="Graphic 82" descr="Ant outline">
-            <a:extLst>
-              <a:ext uri="{FF2B5EF4-FFF2-40B4-BE49-F238E27FC236}">
-                <a16:creationId xmlns:a16="http://schemas.microsoft.com/office/drawing/2014/main" id="{DA58C670-9C7B-88EC-FBE5-3F4381315C50}"/>
+          <p:cNvPr id="103" name="Graphic 102" descr="Hourglass Finished with solid fill">
+            <a:extLst>
+              <a:ext uri="{FF2B5EF4-FFF2-40B4-BE49-F238E27FC236}">
+                <a16:creationId xmlns:a16="http://schemas.microsoft.com/office/drawing/2014/main" id="{BFB82478-4AFC-F1D2-1480-BEAD1D868CA6}"/>
               </a:ext>
             </a:extLst>
           </p:cNvPr>
@@ -6047,10 +4019,10 @@
           <p:nvPr/>
         </p:nvPicPr>
         <p:blipFill>
-          <a:blip r:embed="rId10">
+          <a:blip r:embed="rId2">
             <a:extLst>
               <a:ext uri="{96DAC541-7B7A-43D3-8B79-37D633B846F1}">
-                <asvg:svgBlip xmlns:asvg="http://schemas.microsoft.com/office/drawing/2016/SVG/main" r:embed="rId11"/>
+                <asvg:svgBlip xmlns:asvg="http://schemas.microsoft.com/office/drawing/2016/SVG/main" r:embed="rId3"/>
               </a:ext>
             </a:extLst>
           </a:blip>
@@ -6060,416 +4032,20 @@
         </p:blipFill>
         <p:spPr>
           <a:xfrm>
-            <a:off x="456956" y="4397180"/>
-            <a:ext cx="214313" cy="214313"/>
+            <a:off x="1628674" y="4716052"/>
+            <a:ext cx="1105090" cy="1105090"/>
           </a:xfrm>
           <a:prstGeom prst="rect">
             <a:avLst/>
           </a:prstGeom>
         </p:spPr>
       </p:pic>
-      <p:pic>
-        <p:nvPicPr>
-          <p:cNvPr id="84" name="Graphic 83" descr="Ant outline">
-            <a:extLst>
-              <a:ext uri="{FF2B5EF4-FFF2-40B4-BE49-F238E27FC236}">
-                <a16:creationId xmlns:a16="http://schemas.microsoft.com/office/drawing/2014/main" id="{12FD9153-6CD0-8B8E-F655-DEE6B43C3057}"/>
-              </a:ext>
-            </a:extLst>
-          </p:cNvPr>
-          <p:cNvPicPr>
-            <a:picLocks noChangeAspect="1"/>
-          </p:cNvPicPr>
-          <p:nvPr/>
-        </p:nvPicPr>
-        <p:blipFill>
-          <a:blip r:embed="rId10">
-            <a:extLst>
-              <a:ext uri="{96DAC541-7B7A-43D3-8B79-37D633B846F1}">
-                <asvg:svgBlip xmlns:asvg="http://schemas.microsoft.com/office/drawing/2016/SVG/main" r:embed="rId11"/>
-              </a:ext>
-            </a:extLst>
-          </a:blip>
-          <a:stretch>
-            <a:fillRect/>
-          </a:stretch>
-        </p:blipFill>
-        <p:spPr>
-          <a:xfrm>
-            <a:off x="487602" y="4535075"/>
-            <a:ext cx="214313" cy="214313"/>
-          </a:xfrm>
-          <a:prstGeom prst="rect">
-            <a:avLst/>
-          </a:prstGeom>
-        </p:spPr>
-      </p:pic>
-      <p:pic>
-        <p:nvPicPr>
-          <p:cNvPr id="85" name="Graphic 84" descr="Ant outline">
-            <a:extLst>
-              <a:ext uri="{FF2B5EF4-FFF2-40B4-BE49-F238E27FC236}">
-                <a16:creationId xmlns:a16="http://schemas.microsoft.com/office/drawing/2014/main" id="{9ACA2137-33B7-00B0-C1A0-F332D465AA74}"/>
-              </a:ext>
-            </a:extLst>
-          </p:cNvPr>
-          <p:cNvPicPr>
-            <a:picLocks noChangeAspect="1"/>
-          </p:cNvPicPr>
-          <p:nvPr/>
-        </p:nvPicPr>
-        <p:blipFill>
-          <a:blip r:embed="rId10">
-            <a:extLst>
-              <a:ext uri="{96DAC541-7B7A-43D3-8B79-37D633B846F1}">
-                <asvg:svgBlip xmlns:asvg="http://schemas.microsoft.com/office/drawing/2016/SVG/main" r:embed="rId11"/>
-              </a:ext>
-            </a:extLst>
-          </a:blip>
-          <a:stretch>
-            <a:fillRect/>
-          </a:stretch>
-        </p:blipFill>
-        <p:spPr>
-          <a:xfrm>
-            <a:off x="572418" y="4427919"/>
-            <a:ext cx="214313" cy="214313"/>
-          </a:xfrm>
-          <a:prstGeom prst="rect">
-            <a:avLst/>
-          </a:prstGeom>
-        </p:spPr>
-      </p:pic>
-      <p:pic>
-        <p:nvPicPr>
-          <p:cNvPr id="86" name="Graphic 85" descr="Ant outline">
-            <a:extLst>
-              <a:ext uri="{FF2B5EF4-FFF2-40B4-BE49-F238E27FC236}">
-                <a16:creationId xmlns:a16="http://schemas.microsoft.com/office/drawing/2014/main" id="{08BB3763-D9A4-A835-BBC9-382820A24C16}"/>
-              </a:ext>
-            </a:extLst>
-          </p:cNvPr>
-          <p:cNvPicPr>
-            <a:picLocks noChangeAspect="1"/>
-          </p:cNvPicPr>
-          <p:nvPr/>
-        </p:nvPicPr>
-        <p:blipFill>
-          <a:blip r:embed="rId10">
-            <a:extLst>
-              <a:ext uri="{96DAC541-7B7A-43D3-8B79-37D633B846F1}">
-                <asvg:svgBlip xmlns:asvg="http://schemas.microsoft.com/office/drawing/2016/SVG/main" r:embed="rId11"/>
-              </a:ext>
-            </a:extLst>
-          </a:blip>
-          <a:stretch>
-            <a:fillRect/>
-          </a:stretch>
-        </p:blipFill>
-        <p:spPr>
-          <a:xfrm>
-            <a:off x="622705" y="4568796"/>
-            <a:ext cx="214313" cy="214313"/>
-          </a:xfrm>
-          <a:prstGeom prst="rect">
-            <a:avLst/>
-          </a:prstGeom>
-        </p:spPr>
-      </p:pic>
-      <p:pic>
-        <p:nvPicPr>
-          <p:cNvPr id="87" name="Graphic 86" descr="Ant outline">
-            <a:extLst>
-              <a:ext uri="{FF2B5EF4-FFF2-40B4-BE49-F238E27FC236}">
-                <a16:creationId xmlns:a16="http://schemas.microsoft.com/office/drawing/2014/main" id="{77AF9ACA-A3CB-ED96-7EF8-00FB8C2D9FE8}"/>
-              </a:ext>
-            </a:extLst>
-          </p:cNvPr>
-          <p:cNvPicPr>
-            <a:picLocks noChangeAspect="1"/>
-          </p:cNvPicPr>
-          <p:nvPr/>
-        </p:nvPicPr>
-        <p:blipFill>
-          <a:blip r:embed="rId10">
-            <a:extLst>
-              <a:ext uri="{96DAC541-7B7A-43D3-8B79-37D633B846F1}">
-                <asvg:svgBlip xmlns:asvg="http://schemas.microsoft.com/office/drawing/2016/SVG/main" r:embed="rId11"/>
-              </a:ext>
-            </a:extLst>
-          </a:blip>
-          <a:stretch>
-            <a:fillRect/>
-          </a:stretch>
-        </p:blipFill>
-        <p:spPr>
-          <a:xfrm>
-            <a:off x="372295" y="4596551"/>
-            <a:ext cx="214313" cy="214313"/>
-          </a:xfrm>
-          <a:prstGeom prst="rect">
-            <a:avLst/>
-          </a:prstGeom>
-        </p:spPr>
-      </p:pic>
-      <p:pic>
-        <p:nvPicPr>
-          <p:cNvPr id="88" name="Graphic 87" descr="Ant outline">
-            <a:extLst>
-              <a:ext uri="{FF2B5EF4-FFF2-40B4-BE49-F238E27FC236}">
-                <a16:creationId xmlns:a16="http://schemas.microsoft.com/office/drawing/2014/main" id="{839E6D3F-F390-FD2E-AF9A-54512398CEDD}"/>
-              </a:ext>
-            </a:extLst>
-          </p:cNvPr>
-          <p:cNvPicPr>
-            <a:picLocks noChangeAspect="1"/>
-          </p:cNvPicPr>
-          <p:nvPr/>
-        </p:nvPicPr>
-        <p:blipFill>
-          <a:blip r:embed="rId10">
-            <a:extLst>
-              <a:ext uri="{96DAC541-7B7A-43D3-8B79-37D633B846F1}">
-                <asvg:svgBlip xmlns:asvg="http://schemas.microsoft.com/office/drawing/2016/SVG/main" r:embed="rId11"/>
-              </a:ext>
-            </a:extLst>
-          </a:blip>
-          <a:stretch>
-            <a:fillRect/>
-          </a:stretch>
-        </p:blipFill>
-        <p:spPr>
-          <a:xfrm>
-            <a:off x="670231" y="4366442"/>
-            <a:ext cx="214313" cy="214313"/>
-          </a:xfrm>
-          <a:prstGeom prst="rect">
-            <a:avLst/>
-          </a:prstGeom>
-        </p:spPr>
-      </p:pic>
-      <p:pic>
-        <p:nvPicPr>
-          <p:cNvPr id="89" name="Graphic 88" descr="Ant outline">
-            <a:extLst>
-              <a:ext uri="{FF2B5EF4-FFF2-40B4-BE49-F238E27FC236}">
-                <a16:creationId xmlns:a16="http://schemas.microsoft.com/office/drawing/2014/main" id="{3A188AF8-27DC-C68C-DE7C-369B9356BC3E}"/>
-              </a:ext>
-            </a:extLst>
-          </p:cNvPr>
-          <p:cNvPicPr>
-            <a:picLocks noChangeAspect="1"/>
-          </p:cNvPicPr>
-          <p:nvPr/>
-        </p:nvPicPr>
-        <p:blipFill>
-          <a:blip r:embed="rId10">
-            <a:extLst>
-              <a:ext uri="{96DAC541-7B7A-43D3-8B79-37D633B846F1}">
-                <asvg:svgBlip xmlns:asvg="http://schemas.microsoft.com/office/drawing/2016/SVG/main" r:embed="rId11"/>
-              </a:ext>
-            </a:extLst>
-          </a:blip>
-          <a:stretch>
-            <a:fillRect/>
-          </a:stretch>
-        </p:blipFill>
-        <p:spPr>
-          <a:xfrm>
-            <a:off x="738012" y="4515760"/>
-            <a:ext cx="214313" cy="214313"/>
-          </a:xfrm>
-          <a:prstGeom prst="rect">
-            <a:avLst/>
-          </a:prstGeom>
-        </p:spPr>
-      </p:pic>
-      <p:pic>
-        <p:nvPicPr>
-          <p:cNvPr id="90" name="Graphic 89" descr="Ant outline">
-            <a:extLst>
-              <a:ext uri="{FF2B5EF4-FFF2-40B4-BE49-F238E27FC236}">
-                <a16:creationId xmlns:a16="http://schemas.microsoft.com/office/drawing/2014/main" id="{A812503B-5579-B022-2732-B84415E8AEE7}"/>
-              </a:ext>
-            </a:extLst>
-          </p:cNvPr>
-          <p:cNvPicPr>
-            <a:picLocks noChangeAspect="1"/>
-          </p:cNvPicPr>
-          <p:nvPr/>
-        </p:nvPicPr>
-        <p:blipFill>
-          <a:blip r:embed="rId10">
-            <a:extLst>
-              <a:ext uri="{96DAC541-7B7A-43D3-8B79-37D633B846F1}">
-                <asvg:svgBlip xmlns:asvg="http://schemas.microsoft.com/office/drawing/2016/SVG/main" r:embed="rId11"/>
-              </a:ext>
-            </a:extLst>
-          </a:blip>
-          <a:stretch>
-            <a:fillRect/>
-          </a:stretch>
-        </p:blipFill>
-        <p:spPr>
-          <a:xfrm>
-            <a:off x="630606" y="4724841"/>
-            <a:ext cx="214313" cy="214313"/>
-          </a:xfrm>
-          <a:prstGeom prst="rect">
-            <a:avLst/>
-          </a:prstGeom>
-        </p:spPr>
-      </p:pic>
-      <p:pic>
-        <p:nvPicPr>
-          <p:cNvPr id="91" name="Graphic 90" descr="Ant outline">
-            <a:extLst>
-              <a:ext uri="{FF2B5EF4-FFF2-40B4-BE49-F238E27FC236}">
-                <a16:creationId xmlns:a16="http://schemas.microsoft.com/office/drawing/2014/main" id="{68B9A411-29B7-FE82-DD69-D787C0723402}"/>
-              </a:ext>
-            </a:extLst>
-          </p:cNvPr>
-          <p:cNvPicPr>
-            <a:picLocks noChangeAspect="1"/>
-          </p:cNvPicPr>
-          <p:nvPr/>
-        </p:nvPicPr>
-        <p:blipFill>
-          <a:blip r:embed="rId10">
-            <a:extLst>
-              <a:ext uri="{96DAC541-7B7A-43D3-8B79-37D633B846F1}">
-                <asvg:svgBlip xmlns:asvg="http://schemas.microsoft.com/office/drawing/2016/SVG/main" r:embed="rId11"/>
-              </a:ext>
-            </a:extLst>
-          </a:blip>
-          <a:stretch>
-            <a:fillRect/>
-          </a:stretch>
-        </p:blipFill>
-        <p:spPr>
-          <a:xfrm>
-            <a:off x="729861" y="4668596"/>
-            <a:ext cx="214313" cy="214313"/>
-          </a:xfrm>
-          <a:prstGeom prst="rect">
-            <a:avLst/>
-          </a:prstGeom>
-        </p:spPr>
-      </p:pic>
-      <p:pic>
-        <p:nvPicPr>
-          <p:cNvPr id="92" name="Graphic 91" descr="Ant outline">
-            <a:extLst>
-              <a:ext uri="{FF2B5EF4-FFF2-40B4-BE49-F238E27FC236}">
-                <a16:creationId xmlns:a16="http://schemas.microsoft.com/office/drawing/2014/main" id="{A67DCC1D-503C-7F11-3C59-0A3E1C5B0E16}"/>
-              </a:ext>
-            </a:extLst>
-          </p:cNvPr>
-          <p:cNvPicPr>
-            <a:picLocks noChangeAspect="1"/>
-          </p:cNvPicPr>
-          <p:nvPr/>
-        </p:nvPicPr>
-        <p:blipFill>
-          <a:blip r:embed="rId10">
-            <a:extLst>
-              <a:ext uri="{96DAC541-7B7A-43D3-8B79-37D633B846F1}">
-                <asvg:svgBlip xmlns:asvg="http://schemas.microsoft.com/office/drawing/2016/SVG/main" r:embed="rId11"/>
-              </a:ext>
-            </a:extLst>
-          </a:blip>
-          <a:stretch>
-            <a:fillRect/>
-          </a:stretch>
-        </p:blipFill>
-        <p:spPr>
-          <a:xfrm>
-            <a:off x="849696" y="4580755"/>
-            <a:ext cx="214313" cy="214313"/>
-          </a:xfrm>
-          <a:prstGeom prst="rect">
-            <a:avLst/>
-          </a:prstGeom>
-        </p:spPr>
-      </p:pic>
-      <p:pic>
-        <p:nvPicPr>
-          <p:cNvPr id="93" name="Graphic 92" descr="Ant outline">
-            <a:extLst>
-              <a:ext uri="{FF2B5EF4-FFF2-40B4-BE49-F238E27FC236}">
-                <a16:creationId xmlns:a16="http://schemas.microsoft.com/office/drawing/2014/main" id="{355F1045-BC45-49E3-65A9-F22A55955747}"/>
-              </a:ext>
-            </a:extLst>
-          </p:cNvPr>
-          <p:cNvPicPr>
-            <a:picLocks noChangeAspect="1"/>
-          </p:cNvPicPr>
-          <p:nvPr/>
-        </p:nvPicPr>
-        <p:blipFill>
-          <a:blip r:embed="rId10">
-            <a:extLst>
-              <a:ext uri="{96DAC541-7B7A-43D3-8B79-37D633B846F1}">
-                <asvg:svgBlip xmlns:asvg="http://schemas.microsoft.com/office/drawing/2016/SVG/main" r:embed="rId11"/>
-              </a:ext>
-            </a:extLst>
-          </a:blip>
-          <a:stretch>
-            <a:fillRect/>
-          </a:stretch>
-        </p:blipFill>
-        <p:spPr>
-          <a:xfrm>
-            <a:off x="510308" y="4704851"/>
-            <a:ext cx="214313" cy="214313"/>
-          </a:xfrm>
-          <a:prstGeom prst="rect">
-            <a:avLst/>
-          </a:prstGeom>
-        </p:spPr>
-      </p:pic>
-      <p:pic>
-        <p:nvPicPr>
-          <p:cNvPr id="95" name="Graphic 94" descr="Hourglass Finished with solid fill">
-            <a:extLst>
-              <a:ext uri="{FF2B5EF4-FFF2-40B4-BE49-F238E27FC236}">
-                <a16:creationId xmlns:a16="http://schemas.microsoft.com/office/drawing/2014/main" id="{C14CE5DD-1A91-77A3-7253-39AB07B93AD6}"/>
-              </a:ext>
-            </a:extLst>
-          </p:cNvPr>
-          <p:cNvPicPr>
-            <a:picLocks noChangeAspect="1"/>
-          </p:cNvPicPr>
-          <p:nvPr/>
-        </p:nvPicPr>
-        <p:blipFill>
-          <a:blip r:embed="rId12">
-            <a:extLst>
-              <a:ext uri="{96DAC541-7B7A-43D3-8B79-37D633B846F1}">
-                <asvg:svgBlip xmlns:asvg="http://schemas.microsoft.com/office/drawing/2016/SVG/main" r:embed="rId13"/>
-              </a:ext>
-            </a:extLst>
-          </a:blip>
-          <a:stretch>
-            <a:fillRect/>
-          </a:stretch>
-        </p:blipFill>
-        <p:spPr>
-          <a:xfrm>
-            <a:off x="3677614" y="2710124"/>
-            <a:ext cx="599541" cy="599541"/>
-          </a:xfrm>
-          <a:prstGeom prst="rect">
-            <a:avLst/>
-          </a:prstGeom>
-        </p:spPr>
-      </p:pic>
-      <p:sp>
-        <p:nvSpPr>
-          <p:cNvPr id="96" name="TextBox 95">
-            <a:extLst>
-              <a:ext uri="{FF2B5EF4-FFF2-40B4-BE49-F238E27FC236}">
-                <a16:creationId xmlns:a16="http://schemas.microsoft.com/office/drawing/2014/main" id="{9841C6B7-8DEB-1605-6DC0-CACBF89019C0}"/>
+      <p:sp>
+        <p:nvSpPr>
+          <p:cNvPr id="104" name="TextBox 103">
+            <a:extLst>
+              <a:ext uri="{FF2B5EF4-FFF2-40B4-BE49-F238E27FC236}">
+                <a16:creationId xmlns:a16="http://schemas.microsoft.com/office/drawing/2014/main" id="{87C3CD3F-6A30-DA22-E94B-7709749738D7}"/>
               </a:ext>
             </a:extLst>
           </p:cNvPr>
@@ -6478,334 +4054,8 @@
         </p:nvSpPr>
         <p:spPr>
           <a:xfrm>
-            <a:off x="3831776" y="2754237"/>
-            <a:ext cx="305531" cy="215444"/>
-          </a:xfrm>
-          <a:prstGeom prst="rect">
-            <a:avLst/>
-          </a:prstGeom>
-          <a:noFill/>
-        </p:spPr>
-        <p:txBody>
-          <a:bodyPr wrap="square" rtlCol="0">
-            <a:spAutoFit/>
-          </a:bodyPr>
-          <a:lstStyle/>
-          <a:p>
-            <a:r>
-              <a:rPr lang="en-US" sz="800" b="1" dirty="0">
-                <a:solidFill>
-                  <a:srgbClr val="FFC000"/>
-                </a:solidFill>
-              </a:rPr>
-              <a:t>30</a:t>
-            </a:r>
-            <a:endParaRPr lang="en-CA" sz="800" b="1" dirty="0">
-              <a:solidFill>
-                <a:srgbClr val="FFC000"/>
-              </a:solidFill>
-            </a:endParaRPr>
-          </a:p>
-        </p:txBody>
-      </p:sp>
-      <p:pic>
-        <p:nvPicPr>
-          <p:cNvPr id="97" name="Graphic 96" descr="Hourglass Finished with solid fill">
-            <a:extLst>
-              <a:ext uri="{FF2B5EF4-FFF2-40B4-BE49-F238E27FC236}">
-                <a16:creationId xmlns:a16="http://schemas.microsoft.com/office/drawing/2014/main" id="{D774D465-CF18-0818-4512-C5750F4949F1}"/>
-              </a:ext>
-            </a:extLst>
-          </p:cNvPr>
-          <p:cNvPicPr>
-            <a:picLocks noChangeAspect="1"/>
-          </p:cNvPicPr>
-          <p:nvPr/>
-        </p:nvPicPr>
-        <p:blipFill>
-          <a:blip r:embed="rId14">
-            <a:extLst>
-              <a:ext uri="{96DAC541-7B7A-43D3-8B79-37D633B846F1}">
-                <asvg:svgBlip xmlns:asvg="http://schemas.microsoft.com/office/drawing/2016/SVG/main" r:embed="rId15"/>
-              </a:ext>
-            </a:extLst>
-          </a:blip>
-          <a:stretch>
-            <a:fillRect/>
-          </a:stretch>
-        </p:blipFill>
-        <p:spPr>
-          <a:xfrm>
-            <a:off x="3695366" y="3297718"/>
-            <a:ext cx="599541" cy="599541"/>
-          </a:xfrm>
-          <a:prstGeom prst="rect">
-            <a:avLst/>
-          </a:prstGeom>
-        </p:spPr>
-      </p:pic>
-      <p:pic>
-        <p:nvPicPr>
-          <p:cNvPr id="98" name="Graphic 97" descr="Hourglass Finished with solid fill">
-            <a:extLst>
-              <a:ext uri="{FF2B5EF4-FFF2-40B4-BE49-F238E27FC236}">
-                <a16:creationId xmlns:a16="http://schemas.microsoft.com/office/drawing/2014/main" id="{DB7AC713-64AE-5A84-3EEF-A7F6DC6D0323}"/>
-              </a:ext>
-            </a:extLst>
-          </p:cNvPr>
-          <p:cNvPicPr>
-            <a:picLocks noChangeAspect="1"/>
-          </p:cNvPicPr>
-          <p:nvPr/>
-        </p:nvPicPr>
-        <p:blipFill>
-          <a:blip r:embed="rId16">
-            <a:extLst>
-              <a:ext uri="{96DAC541-7B7A-43D3-8B79-37D633B846F1}">
-                <asvg:svgBlip xmlns:asvg="http://schemas.microsoft.com/office/drawing/2016/SVG/main" r:embed="rId17"/>
-              </a:ext>
-            </a:extLst>
-          </a:blip>
-          <a:stretch>
-            <a:fillRect/>
-          </a:stretch>
-        </p:blipFill>
-        <p:spPr>
-          <a:xfrm>
-            <a:off x="3711398" y="3863186"/>
-            <a:ext cx="599541" cy="599541"/>
-          </a:xfrm>
-          <a:prstGeom prst="rect">
-            <a:avLst/>
-          </a:prstGeom>
-        </p:spPr>
-      </p:pic>
-      <p:pic>
-        <p:nvPicPr>
-          <p:cNvPr id="99" name="Graphic 98" descr="Hourglass Finished with solid fill">
-            <a:extLst>
-              <a:ext uri="{FF2B5EF4-FFF2-40B4-BE49-F238E27FC236}">
-                <a16:creationId xmlns:a16="http://schemas.microsoft.com/office/drawing/2014/main" id="{F2F9C26F-330C-5868-1932-A645EBC8EC43}"/>
-              </a:ext>
-            </a:extLst>
-          </p:cNvPr>
-          <p:cNvPicPr>
-            <a:picLocks noChangeAspect="1"/>
-          </p:cNvPicPr>
-          <p:nvPr/>
-        </p:nvPicPr>
-        <p:blipFill>
-          <a:blip r:embed="rId18">
-            <a:extLst>
-              <a:ext uri="{96DAC541-7B7A-43D3-8B79-37D633B846F1}">
-                <asvg:svgBlip xmlns:asvg="http://schemas.microsoft.com/office/drawing/2016/SVG/main" r:embed="rId19"/>
-              </a:ext>
-            </a:extLst>
-          </a:blip>
-          <a:stretch>
-            <a:fillRect/>
-          </a:stretch>
-        </p:blipFill>
-        <p:spPr>
-          <a:xfrm>
-            <a:off x="3711398" y="4427919"/>
-            <a:ext cx="599541" cy="599541"/>
-          </a:xfrm>
-          <a:prstGeom prst="rect">
-            <a:avLst/>
-          </a:prstGeom>
-        </p:spPr>
-      </p:pic>
-      <p:sp>
-        <p:nvSpPr>
-          <p:cNvPr id="100" name="TextBox 99">
-            <a:extLst>
-              <a:ext uri="{FF2B5EF4-FFF2-40B4-BE49-F238E27FC236}">
-                <a16:creationId xmlns:a16="http://schemas.microsoft.com/office/drawing/2014/main" id="{AE283A5F-3731-B740-2479-ADC0F98ADF66}"/>
-              </a:ext>
-            </a:extLst>
-          </p:cNvPr>
-          <p:cNvSpPr txBox="1"/>
-          <p:nvPr/>
-        </p:nvSpPr>
-        <p:spPr>
-          <a:xfrm>
-            <a:off x="3854464" y="3348041"/>
-            <a:ext cx="305531" cy="215444"/>
-          </a:xfrm>
-          <a:prstGeom prst="rect">
-            <a:avLst/>
-          </a:prstGeom>
-          <a:noFill/>
-        </p:spPr>
-        <p:txBody>
-          <a:bodyPr wrap="square" rtlCol="0">
-            <a:spAutoFit/>
-          </a:bodyPr>
-          <a:lstStyle/>
-          <a:p>
-            <a:r>
-              <a:rPr lang="en-US" sz="800" b="1" dirty="0">
-                <a:solidFill>
-                  <a:srgbClr val="7030A0"/>
-                </a:solidFill>
-              </a:rPr>
-              <a:t>60</a:t>
-            </a:r>
-            <a:endParaRPr lang="en-CA" sz="800" b="1" dirty="0">
-              <a:solidFill>
-                <a:srgbClr val="7030A0"/>
-              </a:solidFill>
-            </a:endParaRPr>
-          </a:p>
-        </p:txBody>
-      </p:sp>
-      <p:sp>
-        <p:nvSpPr>
-          <p:cNvPr id="101" name="TextBox 100">
-            <a:extLst>
-              <a:ext uri="{FF2B5EF4-FFF2-40B4-BE49-F238E27FC236}">
-                <a16:creationId xmlns:a16="http://schemas.microsoft.com/office/drawing/2014/main" id="{6CEB86E3-9B82-1A76-A056-D0446E3DCCD9}"/>
-              </a:ext>
-            </a:extLst>
-          </p:cNvPr>
-          <p:cNvSpPr txBox="1"/>
-          <p:nvPr/>
-        </p:nvSpPr>
-        <p:spPr>
-          <a:xfrm>
-            <a:off x="3871997" y="3912774"/>
-            <a:ext cx="305531" cy="215444"/>
-          </a:xfrm>
-          <a:prstGeom prst="rect">
-            <a:avLst/>
-          </a:prstGeom>
-          <a:noFill/>
-        </p:spPr>
-        <p:txBody>
-          <a:bodyPr wrap="square" rtlCol="0">
-            <a:spAutoFit/>
-          </a:bodyPr>
-          <a:lstStyle/>
-          <a:p>
-            <a:r>
-              <a:rPr lang="en-US" sz="800" b="1" dirty="0">
-                <a:solidFill>
-                  <a:schemeClr val="accent1">
-                    <a:lumMod val="60000"/>
-                    <a:lumOff val="40000"/>
-                  </a:schemeClr>
-                </a:solidFill>
-              </a:rPr>
-              <a:t>90</a:t>
-            </a:r>
-            <a:endParaRPr lang="en-CA" sz="800" b="1" dirty="0">
-              <a:solidFill>
-                <a:schemeClr val="accent1">
-                  <a:lumMod val="60000"/>
-                  <a:lumOff val="40000"/>
-                </a:schemeClr>
-              </a:solidFill>
-            </a:endParaRPr>
-          </a:p>
-        </p:txBody>
-      </p:sp>
-      <p:sp>
-        <p:nvSpPr>
-          <p:cNvPr id="102" name="TextBox 101">
-            <a:extLst>
-              <a:ext uri="{FF2B5EF4-FFF2-40B4-BE49-F238E27FC236}">
-                <a16:creationId xmlns:a16="http://schemas.microsoft.com/office/drawing/2014/main" id="{ED0FB404-AE6C-B881-AEAB-7DF4DA01BF47}"/>
-              </a:ext>
-            </a:extLst>
-          </p:cNvPr>
-          <p:cNvSpPr txBox="1"/>
-          <p:nvPr/>
-        </p:nvSpPr>
-        <p:spPr>
-          <a:xfrm>
-            <a:off x="3840178" y="4478440"/>
-            <a:ext cx="403799" cy="215444"/>
-          </a:xfrm>
-          <a:prstGeom prst="rect">
-            <a:avLst/>
-          </a:prstGeom>
-          <a:noFill/>
-        </p:spPr>
-        <p:txBody>
-          <a:bodyPr wrap="square" rtlCol="0">
-            <a:spAutoFit/>
-          </a:bodyPr>
-          <a:lstStyle/>
-          <a:p>
-            <a:r>
-              <a:rPr lang="en-US" sz="800" b="1" dirty="0">
-                <a:solidFill>
-                  <a:srgbClr val="FF9999"/>
-                </a:solidFill>
-              </a:rPr>
-              <a:t>120</a:t>
-            </a:r>
-            <a:endParaRPr lang="en-CA" sz="800" b="1" dirty="0">
-              <a:solidFill>
-                <a:srgbClr val="FF9999"/>
-              </a:solidFill>
-            </a:endParaRPr>
-          </a:p>
-        </p:txBody>
-      </p:sp>
-      <p:pic>
-        <p:nvPicPr>
-          <p:cNvPr id="103" name="Graphic 102" descr="Hourglass Finished with solid fill">
-            <a:extLst>
-              <a:ext uri="{FF2B5EF4-FFF2-40B4-BE49-F238E27FC236}">
-                <a16:creationId xmlns:a16="http://schemas.microsoft.com/office/drawing/2014/main" id="{BFB82478-4AFC-F1D2-1480-BEAD1D868CA6}"/>
-              </a:ext>
-            </a:extLst>
-          </p:cNvPr>
-          <p:cNvPicPr>
-            <a:picLocks noChangeAspect="1"/>
-          </p:cNvPicPr>
-          <p:nvPr/>
-        </p:nvPicPr>
-        <p:blipFill>
-          <a:blip r:embed="rId20">
-            <a:extLst>
-              <a:ext uri="{96DAC541-7B7A-43D3-8B79-37D633B846F1}">
-                <asvg:svgBlip xmlns:asvg="http://schemas.microsoft.com/office/drawing/2016/SVG/main" r:embed="rId21"/>
-              </a:ext>
-            </a:extLst>
-          </a:blip>
-          <a:stretch>
-            <a:fillRect/>
-          </a:stretch>
-        </p:blipFill>
-        <p:spPr>
-          <a:xfrm>
-            <a:off x="1274260" y="4339613"/>
-            <a:ext cx="599541" cy="599541"/>
-          </a:xfrm>
-          <a:prstGeom prst="rect">
-            <a:avLst/>
-          </a:prstGeom>
-        </p:spPr>
-      </p:pic>
-      <p:sp>
-        <p:nvSpPr>
-          <p:cNvPr id="104" name="TextBox 103">
-            <a:extLst>
-              <a:ext uri="{FF2B5EF4-FFF2-40B4-BE49-F238E27FC236}">
-                <a16:creationId xmlns:a16="http://schemas.microsoft.com/office/drawing/2014/main" id="{87C3CD3F-6A30-DA22-E94B-7709749738D7}"/>
-              </a:ext>
-            </a:extLst>
-          </p:cNvPr>
-          <p:cNvSpPr txBox="1"/>
-          <p:nvPr/>
-        </p:nvSpPr>
-        <p:spPr>
-          <a:xfrm>
-            <a:off x="1384934" y="4399187"/>
-            <a:ext cx="403799" cy="215444"/>
+            <a:off x="1650823" y="4839161"/>
+            <a:ext cx="1060792" cy="261610"/>
           </a:xfrm>
           <a:prstGeom prst="rect">
             <a:avLst/>
@@ -6823,16 +4073,1225 @@
           <a:p>
             <a:pPr algn="ctr"/>
             <a:r>
+              <a:rPr lang="en-US" sz="1100" b="1" dirty="0">
+                <a:solidFill>
+                  <a:srgbClr val="28447E"/>
+                </a:solidFill>
+              </a:rPr>
+              <a:t>0 min</a:t>
+            </a:r>
+            <a:endParaRPr lang="en-CA" sz="1100" b="1" dirty="0">
+              <a:solidFill>
+                <a:srgbClr val="28447E"/>
+              </a:solidFill>
+            </a:endParaRPr>
+          </a:p>
+        </p:txBody>
+      </p:sp>
+      <p:pic>
+        <p:nvPicPr>
+          <p:cNvPr id="80" name="Picture 79">
+            <a:extLst>
+              <a:ext uri="{FF2B5EF4-FFF2-40B4-BE49-F238E27FC236}">
+                <a16:creationId xmlns:a16="http://schemas.microsoft.com/office/drawing/2014/main" id="{1C156CFB-60C1-1439-5E23-EF280DEFA16C}"/>
+              </a:ext>
+            </a:extLst>
+          </p:cNvPr>
+          <p:cNvPicPr>
+            <a:picLocks noChangeAspect="1"/>
+          </p:cNvPicPr>
+          <p:nvPr/>
+        </p:nvPicPr>
+        <p:blipFill>
+          <a:blip r:embed="rId4">
+            <a:extLst>
+              <a:ext uri="{28A0092B-C50C-407E-A947-70E740481C1C}">
+                <a14:useLocalDpi xmlns:a14="http://schemas.microsoft.com/office/drawing/2010/main" val="0"/>
+              </a:ext>
+            </a:extLst>
+          </a:blip>
+          <a:srcRect/>
+          <a:stretch/>
+        </p:blipFill>
+        <p:spPr>
+          <a:xfrm rot="1145710">
+            <a:off x="226415" y="4804213"/>
+            <a:ext cx="1441533" cy="1019100"/>
+          </a:xfrm>
+          <a:prstGeom prst="rect">
+            <a:avLst/>
+          </a:prstGeom>
+        </p:spPr>
+      </p:pic>
+      <p:sp>
+        <p:nvSpPr>
+          <p:cNvPr id="94" name="Rectangle 93">
+            <a:extLst>
+              <a:ext uri="{FF2B5EF4-FFF2-40B4-BE49-F238E27FC236}">
+                <a16:creationId xmlns:a16="http://schemas.microsoft.com/office/drawing/2014/main" id="{EF734805-370A-DE4C-417F-F039EE717336}"/>
+              </a:ext>
+            </a:extLst>
+          </p:cNvPr>
+          <p:cNvSpPr/>
+          <p:nvPr/>
+        </p:nvSpPr>
+        <p:spPr>
+          <a:xfrm>
+            <a:off x="4755657" y="2531440"/>
+            <a:ext cx="846281" cy="763473"/>
+          </a:xfrm>
+          <a:prstGeom prst="rect">
+            <a:avLst/>
+          </a:prstGeom>
+          <a:solidFill>
+            <a:schemeClr val="bg1"/>
+          </a:solidFill>
+        </p:spPr>
+        <p:style>
+          <a:lnRef idx="2">
+            <a:schemeClr val="accent1">
+              <a:shade val="15000"/>
+            </a:schemeClr>
+          </a:lnRef>
+          <a:fillRef idx="1">
+            <a:schemeClr val="accent1"/>
+          </a:fillRef>
+          <a:effectRef idx="0">
+            <a:schemeClr val="accent1"/>
+          </a:effectRef>
+          <a:fontRef idx="minor">
+            <a:schemeClr val="lt1"/>
+          </a:fontRef>
+        </p:style>
+        <p:txBody>
+          <a:bodyPr rtlCol="0" anchor="ctr"/>
+          <a:lstStyle/>
+          <a:p>
+            <a:pPr algn="ctr"/>
+            <a:endParaRPr lang="en-CA"/>
+          </a:p>
+        </p:txBody>
+      </p:sp>
+      <p:sp>
+        <p:nvSpPr>
+          <p:cNvPr id="105" name="Rectangle 104">
+            <a:extLst>
+              <a:ext uri="{FF2B5EF4-FFF2-40B4-BE49-F238E27FC236}">
+                <a16:creationId xmlns:a16="http://schemas.microsoft.com/office/drawing/2014/main" id="{F7BDE26F-922D-BB24-E9F1-573753F3BCF2}"/>
+              </a:ext>
+            </a:extLst>
+          </p:cNvPr>
+          <p:cNvSpPr/>
+          <p:nvPr/>
+        </p:nvSpPr>
+        <p:spPr>
+          <a:xfrm>
+            <a:off x="5628687" y="3340134"/>
+            <a:ext cx="846281" cy="763473"/>
+          </a:xfrm>
+          <a:prstGeom prst="rect">
+            <a:avLst/>
+          </a:prstGeom>
+          <a:solidFill>
+            <a:schemeClr val="bg1"/>
+          </a:solidFill>
+        </p:spPr>
+        <p:style>
+          <a:lnRef idx="2">
+            <a:schemeClr val="accent1">
+              <a:shade val="15000"/>
+            </a:schemeClr>
+          </a:lnRef>
+          <a:fillRef idx="1">
+            <a:schemeClr val="accent1"/>
+          </a:fillRef>
+          <a:effectRef idx="0">
+            <a:schemeClr val="accent1"/>
+          </a:effectRef>
+          <a:fontRef idx="minor">
+            <a:schemeClr val="lt1"/>
+          </a:fontRef>
+        </p:style>
+        <p:txBody>
+          <a:bodyPr rtlCol="0" anchor="ctr"/>
+          <a:lstStyle/>
+          <a:p>
+            <a:pPr algn="ctr"/>
+            <a:endParaRPr lang="en-CA"/>
+          </a:p>
+        </p:txBody>
+      </p:sp>
+      <p:sp>
+        <p:nvSpPr>
+          <p:cNvPr id="106" name="Rectangle 105">
+            <a:extLst>
+              <a:ext uri="{FF2B5EF4-FFF2-40B4-BE49-F238E27FC236}">
+                <a16:creationId xmlns:a16="http://schemas.microsoft.com/office/drawing/2014/main" id="{EA76C9AB-1255-9300-8E8B-32495054196F}"/>
+              </a:ext>
+            </a:extLst>
+          </p:cNvPr>
+          <p:cNvSpPr/>
+          <p:nvPr/>
+        </p:nvSpPr>
+        <p:spPr>
+          <a:xfrm>
+            <a:off x="4755657" y="3340134"/>
+            <a:ext cx="846281" cy="763473"/>
+          </a:xfrm>
+          <a:prstGeom prst="rect">
+            <a:avLst/>
+          </a:prstGeom>
+          <a:solidFill>
+            <a:schemeClr val="bg1"/>
+          </a:solidFill>
+        </p:spPr>
+        <p:style>
+          <a:lnRef idx="2">
+            <a:schemeClr val="accent1">
+              <a:shade val="15000"/>
+            </a:schemeClr>
+          </a:lnRef>
+          <a:fillRef idx="1">
+            <a:schemeClr val="accent1"/>
+          </a:fillRef>
+          <a:effectRef idx="0">
+            <a:schemeClr val="accent1"/>
+          </a:effectRef>
+          <a:fontRef idx="minor">
+            <a:schemeClr val="lt1"/>
+          </a:fontRef>
+        </p:style>
+        <p:txBody>
+          <a:bodyPr rtlCol="0" anchor="ctr"/>
+          <a:lstStyle/>
+          <a:p>
+            <a:pPr algn="ctr"/>
+            <a:endParaRPr lang="en-CA"/>
+          </a:p>
+        </p:txBody>
+      </p:sp>
+      <p:sp>
+        <p:nvSpPr>
+          <p:cNvPr id="107" name="Rectangle 106">
+            <a:extLst>
+              <a:ext uri="{FF2B5EF4-FFF2-40B4-BE49-F238E27FC236}">
+                <a16:creationId xmlns:a16="http://schemas.microsoft.com/office/drawing/2014/main" id="{818CAEBA-9278-79F4-0237-119B858280C7}"/>
+              </a:ext>
+            </a:extLst>
+          </p:cNvPr>
+          <p:cNvSpPr/>
+          <p:nvPr/>
+        </p:nvSpPr>
+        <p:spPr>
+          <a:xfrm>
+            <a:off x="5628687" y="4137281"/>
+            <a:ext cx="846281" cy="763473"/>
+          </a:xfrm>
+          <a:prstGeom prst="rect">
+            <a:avLst/>
+          </a:prstGeom>
+          <a:solidFill>
+            <a:schemeClr val="bg1"/>
+          </a:solidFill>
+        </p:spPr>
+        <p:style>
+          <a:lnRef idx="2">
+            <a:schemeClr val="accent1">
+              <a:shade val="15000"/>
+            </a:schemeClr>
+          </a:lnRef>
+          <a:fillRef idx="1">
+            <a:schemeClr val="accent1"/>
+          </a:fillRef>
+          <a:effectRef idx="0">
+            <a:schemeClr val="accent1"/>
+          </a:effectRef>
+          <a:fontRef idx="minor">
+            <a:schemeClr val="lt1"/>
+          </a:fontRef>
+        </p:style>
+        <p:txBody>
+          <a:bodyPr rtlCol="0" anchor="ctr"/>
+          <a:lstStyle/>
+          <a:p>
+            <a:pPr algn="ctr"/>
+            <a:endParaRPr lang="en-CA"/>
+          </a:p>
+        </p:txBody>
+      </p:sp>
+      <p:sp>
+        <p:nvSpPr>
+          <p:cNvPr id="108" name="Rectangle 107">
+            <a:extLst>
+              <a:ext uri="{FF2B5EF4-FFF2-40B4-BE49-F238E27FC236}">
+                <a16:creationId xmlns:a16="http://schemas.microsoft.com/office/drawing/2014/main" id="{048BB69E-A872-9146-B84D-6EEA6F1DA357}"/>
+              </a:ext>
+            </a:extLst>
+          </p:cNvPr>
+          <p:cNvSpPr/>
+          <p:nvPr/>
+        </p:nvSpPr>
+        <p:spPr>
+          <a:xfrm>
+            <a:off x="4755657" y="4137281"/>
+            <a:ext cx="846281" cy="763473"/>
+          </a:xfrm>
+          <a:prstGeom prst="rect">
+            <a:avLst/>
+          </a:prstGeom>
+          <a:solidFill>
+            <a:schemeClr val="bg1"/>
+          </a:solidFill>
+        </p:spPr>
+        <p:style>
+          <a:lnRef idx="2">
+            <a:schemeClr val="accent1">
+              <a:shade val="15000"/>
+            </a:schemeClr>
+          </a:lnRef>
+          <a:fillRef idx="1">
+            <a:schemeClr val="accent1"/>
+          </a:fillRef>
+          <a:effectRef idx="0">
+            <a:schemeClr val="accent1"/>
+          </a:effectRef>
+          <a:fontRef idx="minor">
+            <a:schemeClr val="lt1"/>
+          </a:fontRef>
+        </p:style>
+        <p:txBody>
+          <a:bodyPr rtlCol="0" anchor="ctr"/>
+          <a:lstStyle/>
+          <a:p>
+            <a:pPr algn="ctr"/>
+            <a:endParaRPr lang="en-CA"/>
+          </a:p>
+        </p:txBody>
+      </p:sp>
+      <p:sp>
+        <p:nvSpPr>
+          <p:cNvPr id="109" name="Rectangle 108">
+            <a:extLst>
+              <a:ext uri="{FF2B5EF4-FFF2-40B4-BE49-F238E27FC236}">
+                <a16:creationId xmlns:a16="http://schemas.microsoft.com/office/drawing/2014/main" id="{289A3E01-26BA-C343-7B6F-7925B7585BEF}"/>
+              </a:ext>
+            </a:extLst>
+          </p:cNvPr>
+          <p:cNvSpPr/>
+          <p:nvPr/>
+        </p:nvSpPr>
+        <p:spPr>
+          <a:xfrm>
+            <a:off x="5625883" y="4934428"/>
+            <a:ext cx="846281" cy="763473"/>
+          </a:xfrm>
+          <a:prstGeom prst="rect">
+            <a:avLst/>
+          </a:prstGeom>
+          <a:solidFill>
+            <a:schemeClr val="bg1"/>
+          </a:solidFill>
+        </p:spPr>
+        <p:style>
+          <a:lnRef idx="2">
+            <a:schemeClr val="accent1">
+              <a:shade val="15000"/>
+            </a:schemeClr>
+          </a:lnRef>
+          <a:fillRef idx="1">
+            <a:schemeClr val="accent1"/>
+          </a:fillRef>
+          <a:effectRef idx="0">
+            <a:schemeClr val="accent1"/>
+          </a:effectRef>
+          <a:fontRef idx="minor">
+            <a:schemeClr val="lt1"/>
+          </a:fontRef>
+        </p:style>
+        <p:txBody>
+          <a:bodyPr rtlCol="0" anchor="ctr"/>
+          <a:lstStyle/>
+          <a:p>
+            <a:pPr algn="ctr"/>
+            <a:endParaRPr lang="en-CA"/>
+          </a:p>
+        </p:txBody>
+      </p:sp>
+      <p:sp>
+        <p:nvSpPr>
+          <p:cNvPr id="110" name="Rectangle 109">
+            <a:extLst>
+              <a:ext uri="{FF2B5EF4-FFF2-40B4-BE49-F238E27FC236}">
+                <a16:creationId xmlns:a16="http://schemas.microsoft.com/office/drawing/2014/main" id="{405CCF25-5B16-3D5E-5F26-4BD729644E5C}"/>
+              </a:ext>
+            </a:extLst>
+          </p:cNvPr>
+          <p:cNvSpPr/>
+          <p:nvPr/>
+        </p:nvSpPr>
+        <p:spPr>
+          <a:xfrm>
+            <a:off x="4752853" y="4934428"/>
+            <a:ext cx="846281" cy="763473"/>
+          </a:xfrm>
+          <a:prstGeom prst="rect">
+            <a:avLst/>
+          </a:prstGeom>
+          <a:solidFill>
+            <a:schemeClr val="bg1"/>
+          </a:solidFill>
+        </p:spPr>
+        <p:style>
+          <a:lnRef idx="2">
+            <a:schemeClr val="accent1">
+              <a:shade val="15000"/>
+            </a:schemeClr>
+          </a:lnRef>
+          <a:fillRef idx="1">
+            <a:schemeClr val="accent1"/>
+          </a:fillRef>
+          <a:effectRef idx="0">
+            <a:schemeClr val="accent1"/>
+          </a:effectRef>
+          <a:fontRef idx="minor">
+            <a:schemeClr val="lt1"/>
+          </a:fontRef>
+        </p:style>
+        <p:txBody>
+          <a:bodyPr rtlCol="0" anchor="ctr"/>
+          <a:lstStyle/>
+          <a:p>
+            <a:pPr algn="ctr"/>
+            <a:endParaRPr lang="en-CA"/>
+          </a:p>
+        </p:txBody>
+      </p:sp>
+      <p:pic>
+        <p:nvPicPr>
+          <p:cNvPr id="113" name="Picture 112">
+            <a:extLst>
+              <a:ext uri="{FF2B5EF4-FFF2-40B4-BE49-F238E27FC236}">
+                <a16:creationId xmlns:a16="http://schemas.microsoft.com/office/drawing/2014/main" id="{834F77E3-BC20-60D9-342A-940D87D5E329}"/>
+              </a:ext>
+            </a:extLst>
+          </p:cNvPr>
+          <p:cNvPicPr>
+            <a:picLocks noChangeAspect="1"/>
+          </p:cNvPicPr>
+          <p:nvPr/>
+        </p:nvPicPr>
+        <p:blipFill>
+          <a:blip r:embed="rId5">
+            <a:extLst>
+              <a:ext uri="{28A0092B-C50C-407E-A947-70E740481C1C}">
+                <a14:useLocalDpi xmlns:a14="http://schemas.microsoft.com/office/drawing/2010/main" val="0"/>
+              </a:ext>
+            </a:extLst>
+          </a:blip>
+          <a:srcRect/>
+          <a:stretch/>
+        </p:blipFill>
+        <p:spPr>
+          <a:xfrm rot="1615986">
+            <a:off x="4714883" y="2659955"/>
+            <a:ext cx="922218" cy="651967"/>
+          </a:xfrm>
+          <a:prstGeom prst="rect">
+            <a:avLst/>
+          </a:prstGeom>
+        </p:spPr>
+      </p:pic>
+      <p:pic>
+        <p:nvPicPr>
+          <p:cNvPr id="114" name="Picture 113">
+            <a:extLst>
+              <a:ext uri="{FF2B5EF4-FFF2-40B4-BE49-F238E27FC236}">
+                <a16:creationId xmlns:a16="http://schemas.microsoft.com/office/drawing/2014/main" id="{AF1BB070-663A-E76F-C627-A052F607B685}"/>
+              </a:ext>
+            </a:extLst>
+          </p:cNvPr>
+          <p:cNvPicPr>
+            <a:picLocks noChangeAspect="1"/>
+          </p:cNvPicPr>
+          <p:nvPr/>
+        </p:nvPicPr>
+        <p:blipFill>
+          <a:blip r:embed="rId5">
+            <a:extLst>
+              <a:ext uri="{28A0092B-C50C-407E-A947-70E740481C1C}">
+                <a14:useLocalDpi xmlns:a14="http://schemas.microsoft.com/office/drawing/2010/main" val="0"/>
+              </a:ext>
+            </a:extLst>
+          </a:blip>
+          <a:srcRect/>
+          <a:stretch/>
+        </p:blipFill>
+        <p:spPr>
+          <a:xfrm rot="1615986">
+            <a:off x="5570207" y="4233617"/>
+            <a:ext cx="922218" cy="651967"/>
+          </a:xfrm>
+          <a:prstGeom prst="rect">
+            <a:avLst/>
+          </a:prstGeom>
+        </p:spPr>
+      </p:pic>
+      <p:pic>
+        <p:nvPicPr>
+          <p:cNvPr id="115" name="Picture 114">
+            <a:extLst>
+              <a:ext uri="{FF2B5EF4-FFF2-40B4-BE49-F238E27FC236}">
+                <a16:creationId xmlns:a16="http://schemas.microsoft.com/office/drawing/2014/main" id="{BCE65AFF-5BA4-5FE4-72B5-DECA9480AB74}"/>
+              </a:ext>
+            </a:extLst>
+          </p:cNvPr>
+          <p:cNvPicPr>
+            <a:picLocks noChangeAspect="1"/>
+          </p:cNvPicPr>
+          <p:nvPr/>
+        </p:nvPicPr>
+        <p:blipFill>
+          <a:blip r:embed="rId6">
+            <a:extLst>
+              <a:ext uri="{28A0092B-C50C-407E-A947-70E740481C1C}">
+                <a14:useLocalDpi xmlns:a14="http://schemas.microsoft.com/office/drawing/2010/main" val="0"/>
+              </a:ext>
+            </a:extLst>
+          </a:blip>
+          <a:srcRect/>
+          <a:stretch/>
+        </p:blipFill>
+        <p:spPr>
+          <a:xfrm rot="1615986">
+            <a:off x="5570206" y="2659954"/>
+            <a:ext cx="922217" cy="651967"/>
+          </a:xfrm>
+          <a:prstGeom prst="rect">
+            <a:avLst/>
+          </a:prstGeom>
+        </p:spPr>
+      </p:pic>
+      <p:pic>
+        <p:nvPicPr>
+          <p:cNvPr id="116" name="Picture 115">
+            <a:extLst>
+              <a:ext uri="{FF2B5EF4-FFF2-40B4-BE49-F238E27FC236}">
+                <a16:creationId xmlns:a16="http://schemas.microsoft.com/office/drawing/2014/main" id="{B286225F-992E-F0A9-F9C3-0B888CFF61EA}"/>
+              </a:ext>
+            </a:extLst>
+          </p:cNvPr>
+          <p:cNvPicPr>
+            <a:picLocks noChangeAspect="1"/>
+          </p:cNvPicPr>
+          <p:nvPr/>
+        </p:nvPicPr>
+        <p:blipFill>
+          <a:blip r:embed="rId6">
+            <a:extLst>
+              <a:ext uri="{28A0092B-C50C-407E-A947-70E740481C1C}">
+                <a14:useLocalDpi xmlns:a14="http://schemas.microsoft.com/office/drawing/2010/main" val="0"/>
+              </a:ext>
+            </a:extLst>
+          </a:blip>
+          <a:srcRect/>
+          <a:stretch/>
+        </p:blipFill>
+        <p:spPr>
+          <a:xfrm rot="1615986">
+            <a:off x="5570207" y="4995673"/>
+            <a:ext cx="922217" cy="651967"/>
+          </a:xfrm>
+          <a:prstGeom prst="rect">
+            <a:avLst/>
+          </a:prstGeom>
+        </p:spPr>
+      </p:pic>
+      <p:pic>
+        <p:nvPicPr>
+          <p:cNvPr id="117" name="Picture 116">
+            <a:extLst>
+              <a:ext uri="{FF2B5EF4-FFF2-40B4-BE49-F238E27FC236}">
+                <a16:creationId xmlns:a16="http://schemas.microsoft.com/office/drawing/2014/main" id="{4EFC0D1F-6C82-B6F6-3EBB-A1CBEDF430AE}"/>
+              </a:ext>
+            </a:extLst>
+          </p:cNvPr>
+          <p:cNvPicPr>
+            <a:picLocks noChangeAspect="1"/>
+          </p:cNvPicPr>
+          <p:nvPr/>
+        </p:nvPicPr>
+        <p:blipFill>
+          <a:blip r:embed="rId7">
+            <a:extLst>
+              <a:ext uri="{28A0092B-C50C-407E-A947-70E740481C1C}">
+                <a14:useLocalDpi xmlns:a14="http://schemas.microsoft.com/office/drawing/2010/main" val="0"/>
+              </a:ext>
+            </a:extLst>
+          </a:blip>
+          <a:srcRect/>
+          <a:stretch/>
+        </p:blipFill>
+        <p:spPr>
+          <a:xfrm rot="1615986">
+            <a:off x="4700130" y="3446786"/>
+            <a:ext cx="922217" cy="651966"/>
+          </a:xfrm>
+          <a:prstGeom prst="rect">
+            <a:avLst/>
+          </a:prstGeom>
+        </p:spPr>
+      </p:pic>
+      <p:pic>
+        <p:nvPicPr>
+          <p:cNvPr id="118" name="Picture 117">
+            <a:extLst>
+              <a:ext uri="{FF2B5EF4-FFF2-40B4-BE49-F238E27FC236}">
+                <a16:creationId xmlns:a16="http://schemas.microsoft.com/office/drawing/2014/main" id="{7C651913-4839-2764-2C21-3F4E30521434}"/>
+              </a:ext>
+            </a:extLst>
+          </p:cNvPr>
+          <p:cNvPicPr>
+            <a:picLocks noChangeAspect="1"/>
+          </p:cNvPicPr>
+          <p:nvPr/>
+        </p:nvPicPr>
+        <p:blipFill>
+          <a:blip r:embed="rId7">
+            <a:extLst>
+              <a:ext uri="{28A0092B-C50C-407E-A947-70E740481C1C}">
+                <a14:useLocalDpi xmlns:a14="http://schemas.microsoft.com/office/drawing/2010/main" val="0"/>
+              </a:ext>
+            </a:extLst>
+          </a:blip>
+          <a:srcRect/>
+          <a:stretch/>
+        </p:blipFill>
+        <p:spPr>
+          <a:xfrm rot="1615986">
+            <a:off x="4685376" y="4233619"/>
+            <a:ext cx="922217" cy="651966"/>
+          </a:xfrm>
+          <a:prstGeom prst="rect">
+            <a:avLst/>
+          </a:prstGeom>
+        </p:spPr>
+      </p:pic>
+      <p:pic>
+        <p:nvPicPr>
+          <p:cNvPr id="119" name="Picture 118">
+            <a:extLst>
+              <a:ext uri="{FF2B5EF4-FFF2-40B4-BE49-F238E27FC236}">
+                <a16:creationId xmlns:a16="http://schemas.microsoft.com/office/drawing/2014/main" id="{240BA078-DE9C-A1A3-CC57-281CED060B95}"/>
+              </a:ext>
+            </a:extLst>
+          </p:cNvPr>
+          <p:cNvPicPr>
+            <a:picLocks noChangeAspect="1"/>
+          </p:cNvPicPr>
+          <p:nvPr/>
+        </p:nvPicPr>
+        <p:blipFill>
+          <a:blip r:embed="rId8">
+            <a:extLst>
+              <a:ext uri="{28A0092B-C50C-407E-A947-70E740481C1C}">
+                <a14:useLocalDpi xmlns:a14="http://schemas.microsoft.com/office/drawing/2010/main" val="0"/>
+              </a:ext>
+            </a:extLst>
+          </a:blip>
+          <a:srcRect/>
+          <a:stretch/>
+        </p:blipFill>
+        <p:spPr>
+          <a:xfrm rot="1615986">
+            <a:off x="5579229" y="3469910"/>
+            <a:ext cx="922216" cy="651966"/>
+          </a:xfrm>
+          <a:prstGeom prst="rect">
+            <a:avLst/>
+          </a:prstGeom>
+        </p:spPr>
+      </p:pic>
+      <p:pic>
+        <p:nvPicPr>
+          <p:cNvPr id="120" name="Picture 119">
+            <a:extLst>
+              <a:ext uri="{FF2B5EF4-FFF2-40B4-BE49-F238E27FC236}">
+                <a16:creationId xmlns:a16="http://schemas.microsoft.com/office/drawing/2014/main" id="{46C03ED0-5532-B269-D3F3-259B845592DC}"/>
+              </a:ext>
+            </a:extLst>
+          </p:cNvPr>
+          <p:cNvPicPr>
+            <a:picLocks noChangeAspect="1"/>
+          </p:cNvPicPr>
+          <p:nvPr/>
+        </p:nvPicPr>
+        <p:blipFill>
+          <a:blip r:embed="rId8">
+            <a:extLst>
+              <a:ext uri="{28A0092B-C50C-407E-A947-70E740481C1C}">
+                <a14:useLocalDpi xmlns:a14="http://schemas.microsoft.com/office/drawing/2010/main" val="0"/>
+              </a:ext>
+            </a:extLst>
+          </a:blip>
+          <a:srcRect/>
+          <a:stretch/>
+        </p:blipFill>
+        <p:spPr>
+          <a:xfrm rot="1615986">
+            <a:off x="4685378" y="5030763"/>
+            <a:ext cx="922216" cy="651966"/>
+          </a:xfrm>
+          <a:prstGeom prst="rect">
+            <a:avLst/>
+          </a:prstGeom>
+        </p:spPr>
+      </p:pic>
+      <p:pic>
+        <p:nvPicPr>
+          <p:cNvPr id="121" name="Graphic 120" descr="Hourglass Finished with solid fill">
+            <a:extLst>
+              <a:ext uri="{FF2B5EF4-FFF2-40B4-BE49-F238E27FC236}">
+                <a16:creationId xmlns:a16="http://schemas.microsoft.com/office/drawing/2014/main" id="{12CBF44D-ED69-3081-6AB3-384D4C19916C}"/>
+              </a:ext>
+            </a:extLst>
+          </p:cNvPr>
+          <p:cNvPicPr>
+            <a:picLocks noChangeAspect="1"/>
+          </p:cNvPicPr>
+          <p:nvPr/>
+        </p:nvPicPr>
+        <p:blipFill>
+          <a:blip r:embed="rId9">
+            <a:extLst>
+              <a:ext uri="{96DAC541-7B7A-43D3-8B79-37D633B846F1}">
+                <asvg:svgBlip xmlns:asvg="http://schemas.microsoft.com/office/drawing/2016/SVG/main" r:embed="rId10"/>
+              </a:ext>
+            </a:extLst>
+          </a:blip>
+          <a:stretch>
+            <a:fillRect/>
+          </a:stretch>
+        </p:blipFill>
+        <p:spPr>
+          <a:xfrm>
+            <a:off x="6927762" y="2033812"/>
+            <a:ext cx="1105090" cy="1105090"/>
+          </a:xfrm>
+          <a:prstGeom prst="rect">
+            <a:avLst/>
+          </a:prstGeom>
+        </p:spPr>
+      </p:pic>
+      <p:sp>
+        <p:nvSpPr>
+          <p:cNvPr id="122" name="TextBox 121">
+            <a:extLst>
+              <a:ext uri="{FF2B5EF4-FFF2-40B4-BE49-F238E27FC236}">
+                <a16:creationId xmlns:a16="http://schemas.microsoft.com/office/drawing/2014/main" id="{1716A1A3-D126-B2AB-CB9C-C5B18AB703AC}"/>
+              </a:ext>
+            </a:extLst>
+          </p:cNvPr>
+          <p:cNvSpPr txBox="1"/>
+          <p:nvPr/>
+        </p:nvSpPr>
+        <p:spPr>
+          <a:xfrm>
+            <a:off x="6949911" y="2187401"/>
+            <a:ext cx="1060792" cy="215444"/>
+          </a:xfrm>
+          <a:prstGeom prst="rect">
+            <a:avLst/>
+          </a:prstGeom>
+          <a:noFill/>
+          <a:ln>
+            <a:noFill/>
+          </a:ln>
+        </p:spPr>
+        <p:txBody>
+          <a:bodyPr wrap="square" rtlCol="0">
+            <a:spAutoFit/>
+          </a:bodyPr>
+          <a:lstStyle/>
+          <a:p>
+            <a:pPr algn="ctr"/>
+            <a:r>
               <a:rPr lang="en-US" sz="800" b="1" dirty="0">
                 <a:solidFill>
-                  <a:srgbClr val="C00000"/>
+                  <a:srgbClr val="605A93"/>
                 </a:solidFill>
               </a:rPr>
-              <a:t>0</a:t>
+              <a:t>30 min</a:t>
             </a:r>
             <a:endParaRPr lang="en-CA" sz="800" b="1" dirty="0">
               <a:solidFill>
-                <a:srgbClr val="C00000"/>
+                <a:srgbClr val="605A93"/>
+              </a:solidFill>
+            </a:endParaRPr>
+          </a:p>
+        </p:txBody>
+      </p:sp>
+      <p:pic>
+        <p:nvPicPr>
+          <p:cNvPr id="123" name="Graphic 122" descr="Hourglass Finished with solid fill">
+            <a:extLst>
+              <a:ext uri="{FF2B5EF4-FFF2-40B4-BE49-F238E27FC236}">
+                <a16:creationId xmlns:a16="http://schemas.microsoft.com/office/drawing/2014/main" id="{EF13A313-E9DF-422D-F3D0-60E2F92732C2}"/>
+              </a:ext>
+            </a:extLst>
+          </p:cNvPr>
+          <p:cNvPicPr>
+            <a:picLocks noChangeAspect="1"/>
+          </p:cNvPicPr>
+          <p:nvPr/>
+        </p:nvPicPr>
+        <p:blipFill>
+          <a:blip r:embed="rId11">
+            <a:extLst>
+              <a:ext uri="{96DAC541-7B7A-43D3-8B79-37D633B846F1}">
+                <asvg:svgBlip xmlns:asvg="http://schemas.microsoft.com/office/drawing/2016/SVG/main" r:embed="rId12"/>
+              </a:ext>
+            </a:extLst>
+          </a:blip>
+          <a:stretch>
+            <a:fillRect/>
+          </a:stretch>
+        </p:blipFill>
+        <p:spPr>
+          <a:xfrm>
+            <a:off x="6936367" y="3138902"/>
+            <a:ext cx="1105090" cy="1105090"/>
+          </a:xfrm>
+          <a:prstGeom prst="rect">
+            <a:avLst/>
+          </a:prstGeom>
+        </p:spPr>
+      </p:pic>
+      <p:sp>
+        <p:nvSpPr>
+          <p:cNvPr id="124" name="TextBox 123">
+            <a:extLst>
+              <a:ext uri="{FF2B5EF4-FFF2-40B4-BE49-F238E27FC236}">
+                <a16:creationId xmlns:a16="http://schemas.microsoft.com/office/drawing/2014/main" id="{B0FBEE77-E0EE-F9D9-A6F4-3CB07FEA873B}"/>
+              </a:ext>
+            </a:extLst>
+          </p:cNvPr>
+          <p:cNvSpPr txBox="1"/>
+          <p:nvPr/>
+        </p:nvSpPr>
+        <p:spPr>
+          <a:xfrm>
+            <a:off x="6958516" y="3292491"/>
+            <a:ext cx="1060792" cy="215444"/>
+          </a:xfrm>
+          <a:prstGeom prst="rect">
+            <a:avLst/>
+          </a:prstGeom>
+          <a:noFill/>
+          <a:ln>
+            <a:noFill/>
+          </a:ln>
+        </p:spPr>
+        <p:txBody>
+          <a:bodyPr wrap="square" rtlCol="0">
+            <a:spAutoFit/>
+          </a:bodyPr>
+          <a:lstStyle/>
+          <a:p>
+            <a:pPr algn="ctr"/>
+            <a:r>
+              <a:rPr lang="en-US" sz="800" b="1" dirty="0">
+                <a:solidFill>
+                  <a:srgbClr val="BD6375"/>
+                </a:solidFill>
+              </a:rPr>
+              <a:t>60 min</a:t>
+            </a:r>
+            <a:endParaRPr lang="en-CA" sz="800" b="1" dirty="0">
+              <a:solidFill>
+                <a:srgbClr val="BD6375"/>
+              </a:solidFill>
+            </a:endParaRPr>
+          </a:p>
+        </p:txBody>
+      </p:sp>
+      <p:pic>
+        <p:nvPicPr>
+          <p:cNvPr id="125" name="Graphic 124" descr="Hourglass Finished with solid fill">
+            <a:extLst>
+              <a:ext uri="{FF2B5EF4-FFF2-40B4-BE49-F238E27FC236}">
+                <a16:creationId xmlns:a16="http://schemas.microsoft.com/office/drawing/2014/main" id="{DF633608-14F1-C36F-F5A9-4AEC3207512C}"/>
+              </a:ext>
+            </a:extLst>
+          </p:cNvPr>
+          <p:cNvPicPr>
+            <a:picLocks noChangeAspect="1"/>
+          </p:cNvPicPr>
+          <p:nvPr/>
+        </p:nvPicPr>
+        <p:blipFill>
+          <a:blip r:embed="rId13">
+            <a:extLst>
+              <a:ext uri="{96DAC541-7B7A-43D3-8B79-37D633B846F1}">
+                <asvg:svgBlip xmlns:asvg="http://schemas.microsoft.com/office/drawing/2016/SVG/main" r:embed="rId14"/>
+              </a:ext>
+            </a:extLst>
+          </a:blip>
+          <a:stretch>
+            <a:fillRect/>
+          </a:stretch>
+        </p:blipFill>
+        <p:spPr>
+          <a:xfrm>
+            <a:off x="6936367" y="4220001"/>
+            <a:ext cx="1105090" cy="1105090"/>
+          </a:xfrm>
+          <a:prstGeom prst="rect">
+            <a:avLst/>
+          </a:prstGeom>
+        </p:spPr>
+      </p:pic>
+      <p:sp>
+        <p:nvSpPr>
+          <p:cNvPr id="126" name="TextBox 125">
+            <a:extLst>
+              <a:ext uri="{FF2B5EF4-FFF2-40B4-BE49-F238E27FC236}">
+                <a16:creationId xmlns:a16="http://schemas.microsoft.com/office/drawing/2014/main" id="{FB513090-75D7-D179-852F-987D410BB069}"/>
+              </a:ext>
+            </a:extLst>
+          </p:cNvPr>
+          <p:cNvSpPr txBox="1"/>
+          <p:nvPr/>
+        </p:nvSpPr>
+        <p:spPr>
+          <a:xfrm>
+            <a:off x="6966136" y="4381210"/>
+            <a:ext cx="1060792" cy="215444"/>
+          </a:xfrm>
+          <a:prstGeom prst="rect">
+            <a:avLst/>
+          </a:prstGeom>
+          <a:noFill/>
+          <a:ln>
+            <a:noFill/>
+          </a:ln>
+        </p:spPr>
+        <p:txBody>
+          <a:bodyPr wrap="square" rtlCol="0">
+            <a:spAutoFit/>
+          </a:bodyPr>
+          <a:lstStyle/>
+          <a:p>
+            <a:pPr algn="ctr"/>
+            <a:r>
+              <a:rPr lang="en-US" sz="800" b="1" dirty="0">
+                <a:solidFill>
+                  <a:srgbClr val="E48149"/>
+                </a:solidFill>
+              </a:rPr>
+              <a:t>90 min</a:t>
+            </a:r>
+            <a:endParaRPr lang="en-CA" sz="800" b="1" dirty="0">
+              <a:solidFill>
+                <a:srgbClr val="E48149"/>
+              </a:solidFill>
+            </a:endParaRPr>
+          </a:p>
+        </p:txBody>
+      </p:sp>
+      <p:pic>
+        <p:nvPicPr>
+          <p:cNvPr id="127" name="Graphic 126" descr="Hourglass Finished with solid fill">
+            <a:extLst>
+              <a:ext uri="{FF2B5EF4-FFF2-40B4-BE49-F238E27FC236}">
+                <a16:creationId xmlns:a16="http://schemas.microsoft.com/office/drawing/2014/main" id="{97033C03-F678-7EA6-68AB-AC8483E502F4}"/>
+              </a:ext>
+            </a:extLst>
+          </p:cNvPr>
+          <p:cNvPicPr>
+            <a:picLocks noChangeAspect="1"/>
+          </p:cNvPicPr>
+          <p:nvPr/>
+        </p:nvPicPr>
+        <p:blipFill>
+          <a:blip r:embed="rId15">
+            <a:extLst>
+              <a:ext uri="{96DAC541-7B7A-43D3-8B79-37D633B846F1}">
+                <asvg:svgBlip xmlns:asvg="http://schemas.microsoft.com/office/drawing/2016/SVG/main" r:embed="rId16"/>
+              </a:ext>
+            </a:extLst>
+          </a:blip>
+          <a:stretch>
+            <a:fillRect/>
+          </a:stretch>
+        </p:blipFill>
+        <p:spPr>
+          <a:xfrm>
+            <a:off x="6936367" y="5277483"/>
+            <a:ext cx="1105090" cy="1105090"/>
+          </a:xfrm>
+          <a:prstGeom prst="rect">
+            <a:avLst/>
+          </a:prstGeom>
+        </p:spPr>
+      </p:pic>
+      <p:sp>
+        <p:nvSpPr>
+          <p:cNvPr id="128" name="TextBox 127">
+            <a:extLst>
+              <a:ext uri="{FF2B5EF4-FFF2-40B4-BE49-F238E27FC236}">
+                <a16:creationId xmlns:a16="http://schemas.microsoft.com/office/drawing/2014/main" id="{3F972FFB-10A0-3444-3FE8-CB47C33C68BD}"/>
+              </a:ext>
+            </a:extLst>
+          </p:cNvPr>
+          <p:cNvSpPr txBox="1"/>
+          <p:nvPr/>
+        </p:nvSpPr>
+        <p:spPr>
+          <a:xfrm>
+            <a:off x="6958516" y="5400592"/>
+            <a:ext cx="1060792" cy="215444"/>
+          </a:xfrm>
+          <a:prstGeom prst="rect">
+            <a:avLst/>
+          </a:prstGeom>
+          <a:noFill/>
+          <a:ln>
+            <a:noFill/>
+          </a:ln>
+        </p:spPr>
+        <p:txBody>
+          <a:bodyPr wrap="square" rtlCol="0">
+            <a:spAutoFit/>
+          </a:bodyPr>
+          <a:lstStyle/>
+          <a:p>
+            <a:pPr algn="ctr"/>
+            <a:r>
+              <a:rPr lang="en-US" sz="800" b="1" dirty="0">
+                <a:solidFill>
+                  <a:srgbClr val="EEB137"/>
+                </a:solidFill>
+              </a:rPr>
+              <a:t>120 min</a:t>
+            </a:r>
+            <a:endParaRPr lang="en-CA" sz="800" b="1" dirty="0">
+              <a:solidFill>
+                <a:srgbClr val="EEB137"/>
+              </a:solidFill>
+            </a:endParaRPr>
+          </a:p>
+        </p:txBody>
+      </p:sp>
+      <p:cxnSp>
+        <p:nvCxnSpPr>
+          <p:cNvPr id="130" name="Straight Arrow Connector 129">
+            <a:extLst>
+              <a:ext uri="{FF2B5EF4-FFF2-40B4-BE49-F238E27FC236}">
+                <a16:creationId xmlns:a16="http://schemas.microsoft.com/office/drawing/2014/main" id="{1D0490AD-6958-68A0-7C90-5881EF7BC9FE}"/>
+              </a:ext>
+            </a:extLst>
+          </p:cNvPr>
+          <p:cNvCxnSpPr/>
+          <p:nvPr/>
+        </p:nvCxnSpPr>
+        <p:spPr>
+          <a:xfrm>
+            <a:off x="953125" y="2328918"/>
+            <a:ext cx="0" cy="1491202"/>
+          </a:xfrm>
+          <a:prstGeom prst="straightConnector1">
+            <a:avLst/>
+          </a:prstGeom>
+          <a:ln w="38100">
+            <a:solidFill>
+              <a:schemeClr val="tx1"/>
+            </a:solidFill>
+            <a:headEnd type="triangle"/>
+            <a:tailEnd type="triangle"/>
+          </a:ln>
+        </p:spPr>
+        <p:style>
+          <a:lnRef idx="2">
+            <a:schemeClr val="accent1"/>
+          </a:lnRef>
+          <a:fillRef idx="0">
+            <a:schemeClr val="accent1"/>
+          </a:fillRef>
+          <a:effectRef idx="1">
+            <a:schemeClr val="accent1"/>
+          </a:effectRef>
+          <a:fontRef idx="minor">
+            <a:schemeClr val="tx1"/>
+          </a:fontRef>
+        </p:style>
+      </p:cxnSp>
+      <p:sp>
+        <p:nvSpPr>
+          <p:cNvPr id="131" name="TextBox 130">
+            <a:extLst>
+              <a:ext uri="{FF2B5EF4-FFF2-40B4-BE49-F238E27FC236}">
+                <a16:creationId xmlns:a16="http://schemas.microsoft.com/office/drawing/2014/main" id="{0D49CA91-0F93-3CE8-76CF-4C437BDDF4D4}"/>
+              </a:ext>
+            </a:extLst>
+          </p:cNvPr>
+          <p:cNvSpPr txBox="1"/>
+          <p:nvPr/>
+        </p:nvSpPr>
+        <p:spPr>
+          <a:xfrm>
+            <a:off x="1009800" y="2816660"/>
+            <a:ext cx="1237748" cy="338554"/>
+          </a:xfrm>
+          <a:prstGeom prst="rect">
+            <a:avLst/>
+          </a:prstGeom>
+          <a:noFill/>
+          <a:ln>
+            <a:noFill/>
+          </a:ln>
+        </p:spPr>
+        <p:txBody>
+          <a:bodyPr wrap="square" rtlCol="0">
+            <a:spAutoFit/>
+          </a:bodyPr>
+          <a:lstStyle/>
+          <a:p>
+            <a:pPr algn="ctr"/>
+            <a:r>
+              <a:rPr lang="en-US" sz="1600" b="1" dirty="0"/>
+              <a:t>~20 meters</a:t>
+            </a:r>
+            <a:endParaRPr lang="en-CA" sz="1600" b="1" dirty="0"/>
+          </a:p>
+        </p:txBody>
+      </p:sp>
+      <p:sp>
+        <p:nvSpPr>
+          <p:cNvPr id="136" name="TextBox 135">
+            <a:extLst>
+              <a:ext uri="{FF2B5EF4-FFF2-40B4-BE49-F238E27FC236}">
+                <a16:creationId xmlns:a16="http://schemas.microsoft.com/office/drawing/2014/main" id="{1C690672-0C4C-6466-0F57-B98C1C77562A}"/>
+              </a:ext>
+            </a:extLst>
+          </p:cNvPr>
+          <p:cNvSpPr txBox="1"/>
+          <p:nvPr/>
+        </p:nvSpPr>
+        <p:spPr>
+          <a:xfrm>
+            <a:off x="6788510" y="1483771"/>
+            <a:ext cx="1349612" cy="584775"/>
+          </a:xfrm>
+          <a:prstGeom prst="rect">
+            <a:avLst/>
+          </a:prstGeom>
+          <a:noFill/>
+          <a:ln>
+            <a:noFill/>
+          </a:ln>
+        </p:spPr>
+        <p:txBody>
+          <a:bodyPr wrap="square" rtlCol="0">
+            <a:spAutoFit/>
+          </a:bodyPr>
+          <a:lstStyle/>
+          <a:p>
+            <a:pPr algn="ctr"/>
+            <a:r>
+              <a:rPr lang="en-US" sz="1600" b="1" dirty="0"/>
+              <a:t>Air exposure treatment:</a:t>
+            </a:r>
+            <a:endParaRPr lang="en-CA" sz="1600" b="1" dirty="0"/>
+          </a:p>
+        </p:txBody>
+      </p:sp>
+      <p:sp>
+        <p:nvSpPr>
+          <p:cNvPr id="137" name="TextBox 136">
+            <a:extLst>
+              <a:ext uri="{FF2B5EF4-FFF2-40B4-BE49-F238E27FC236}">
+                <a16:creationId xmlns:a16="http://schemas.microsoft.com/office/drawing/2014/main" id="{AE748316-AEF2-84AE-512A-2473895F7AEF}"/>
+              </a:ext>
+            </a:extLst>
+          </p:cNvPr>
+          <p:cNvSpPr txBox="1"/>
+          <p:nvPr/>
+        </p:nvSpPr>
+        <p:spPr>
+          <a:xfrm>
+            <a:off x="-239225" y="6401157"/>
+            <a:ext cx="3440181" cy="523220"/>
+          </a:xfrm>
+          <a:prstGeom prst="rect">
+            <a:avLst/>
+          </a:prstGeom>
+          <a:noFill/>
+          <a:ln>
+            <a:noFill/>
+          </a:ln>
+        </p:spPr>
+        <p:txBody>
+          <a:bodyPr wrap="square" rtlCol="0">
+            <a:spAutoFit/>
+          </a:bodyPr>
+          <a:lstStyle/>
+          <a:p>
+            <a:pPr algn="ctr"/>
+            <a:r>
+              <a:rPr lang="en-US" sz="2800" b="1" dirty="0"/>
+              <a:t>*</a:t>
+            </a:r>
+            <a:r>
+              <a:rPr lang="en-US" sz="1600" b="1" dirty="0"/>
+              <a:t>~35-80 prawns per treatment</a:t>
+            </a:r>
+            <a:endParaRPr lang="en-CA" sz="1600" b="1" dirty="0"/>
+          </a:p>
+        </p:txBody>
+      </p:sp>
+      <p:sp>
+        <p:nvSpPr>
+          <p:cNvPr id="138" name="TextBox 137">
+            <a:extLst>
+              <a:ext uri="{FF2B5EF4-FFF2-40B4-BE49-F238E27FC236}">
+                <a16:creationId xmlns:a16="http://schemas.microsoft.com/office/drawing/2014/main" id="{937D6839-CD93-CF1B-5216-71C9496E84D8}"/>
+              </a:ext>
+            </a:extLst>
+          </p:cNvPr>
+          <p:cNvSpPr txBox="1"/>
+          <p:nvPr/>
+        </p:nvSpPr>
+        <p:spPr>
+          <a:xfrm>
+            <a:off x="1310916" y="4906157"/>
+            <a:ext cx="512955" cy="830997"/>
+          </a:xfrm>
+          <a:prstGeom prst="rect">
+            <a:avLst/>
+          </a:prstGeom>
+          <a:noFill/>
+          <a:ln>
+            <a:noFill/>
+          </a:ln>
+        </p:spPr>
+        <p:txBody>
+          <a:bodyPr wrap="square" rtlCol="0">
+            <a:spAutoFit/>
+          </a:bodyPr>
+          <a:lstStyle/>
+          <a:p>
+            <a:pPr algn="ctr"/>
+            <a:r>
+              <a:rPr lang="en-US" sz="4800" b="1" dirty="0">
+                <a:solidFill>
+                  <a:srgbClr val="28447E"/>
+                </a:solidFill>
+              </a:rPr>
+              <a:t>*</a:t>
+            </a:r>
+            <a:endParaRPr lang="en-CA" sz="4800" b="1" dirty="0">
+              <a:solidFill>
+                <a:srgbClr val="28447E"/>
               </a:solidFill>
             </a:endParaRPr>
           </a:p>

</xml_diff>